<commit_message>
E2E tests in progress.
</commit_message>
<xml_diff>
--- a/deck/Dev Nexus Presentation.pptx
+++ b/deck/Dev Nexus Presentation.pptx
@@ -5,7 +5,7 @@
     <p:sldMasterId id="2147483648" r:id="rId1"/>
   </p:sldMasterIdLst>
   <p:notesMasterIdLst>
-    <p:notesMasterId r:id="rId30"/>
+    <p:notesMasterId r:id="rId34"/>
   </p:notesMasterIdLst>
   <p:sldIdLst>
     <p:sldId id="256" r:id="rId2"/>
@@ -19,23 +19,27 @@
     <p:sldId id="277" r:id="rId10"/>
     <p:sldId id="260" r:id="rId11"/>
     <p:sldId id="280" r:id="rId12"/>
-    <p:sldId id="287" r:id="rId13"/>
-    <p:sldId id="263" r:id="rId14"/>
-    <p:sldId id="288" r:id="rId15"/>
-    <p:sldId id="289" r:id="rId16"/>
-    <p:sldId id="290" r:id="rId17"/>
-    <p:sldId id="265" r:id="rId18"/>
-    <p:sldId id="266" r:id="rId19"/>
-    <p:sldId id="264" r:id="rId20"/>
-    <p:sldId id="278" r:id="rId21"/>
-    <p:sldId id="261" r:id="rId22"/>
-    <p:sldId id="286" r:id="rId23"/>
-    <p:sldId id="267" r:id="rId24"/>
-    <p:sldId id="285" r:id="rId25"/>
-    <p:sldId id="282" r:id="rId26"/>
-    <p:sldId id="262" r:id="rId27"/>
-    <p:sldId id="269" r:id="rId28"/>
-    <p:sldId id="270" r:id="rId29"/>
+    <p:sldId id="293" r:id="rId13"/>
+    <p:sldId id="294" r:id="rId14"/>
+    <p:sldId id="287" r:id="rId15"/>
+    <p:sldId id="296" r:id="rId16"/>
+    <p:sldId id="297" r:id="rId17"/>
+    <p:sldId id="263" r:id="rId18"/>
+    <p:sldId id="299" r:id="rId19"/>
+    <p:sldId id="288" r:id="rId20"/>
+    <p:sldId id="289" r:id="rId21"/>
+    <p:sldId id="290" r:id="rId22"/>
+    <p:sldId id="300" r:id="rId23"/>
+    <p:sldId id="301" r:id="rId24"/>
+    <p:sldId id="278" r:id="rId25"/>
+    <p:sldId id="261" r:id="rId26"/>
+    <p:sldId id="286" r:id="rId27"/>
+    <p:sldId id="267" r:id="rId28"/>
+    <p:sldId id="285" r:id="rId29"/>
+    <p:sldId id="282" r:id="rId30"/>
+    <p:sldId id="262" r:id="rId31"/>
+    <p:sldId id="269" r:id="rId32"/>
+    <p:sldId id="270" r:id="rId33"/>
   </p:sldIdLst>
   <p:sldSz cx="9144000" cy="6858000" type="screen4x3"/>
   <p:notesSz cx="6858000" cy="9144000"/>
@@ -219,7 +223,7 @@
           <a:p>
             <a:fld id="{932844B1-BEF2-0E49-9577-B2FD91F08929}" type="datetimeFigureOut">
               <a:rPr lang="en-US" smtClean="0"/>
-              <a:t>2/13/15</a:t>
+              <a:t>2/16/15</a:t>
             </a:fld>
             <a:endParaRPr lang="en-US"/>
           </a:p>
@@ -1074,7 +1078,7 @@
           <a:p>
             <a:fld id="{DECA9997-28A8-554D-8259-036D0AEFA0A8}" type="slidenum">
               <a:rPr lang="en-US" smtClean="0"/>
-              <a:t>13</a:t>
+              <a:t>17</a:t>
             </a:fld>
             <a:endParaRPr lang="en-US"/>
           </a:p>
@@ -1172,7 +1176,7 @@
           <a:p>
             <a:fld id="{DECA9997-28A8-554D-8259-036D0AEFA0A8}" type="slidenum">
               <a:rPr lang="en-US" smtClean="0"/>
-              <a:t>14</a:t>
+              <a:t>19</a:t>
             </a:fld>
             <a:endParaRPr lang="en-US"/>
           </a:p>
@@ -1280,7 +1284,7 @@
           <a:p>
             <a:fld id="{DECA9997-28A8-554D-8259-036D0AEFA0A8}" type="slidenum">
               <a:rPr lang="en-US" smtClean="0"/>
-              <a:t>15</a:t>
+              <a:t>20</a:t>
             </a:fld>
             <a:endParaRPr lang="en-US"/>
           </a:p>
@@ -1371,7 +1375,7 @@
           <a:p>
             <a:fld id="{DECA9997-28A8-554D-8259-036D0AEFA0A8}" type="slidenum">
               <a:rPr lang="en-US" smtClean="0"/>
-              <a:t>23</a:t>
+              <a:t>27</a:t>
             </a:fld>
             <a:endParaRPr lang="en-US"/>
           </a:p>
@@ -1571,7 +1575,7 @@
           <a:p>
             <a:fld id="{FD8F7154-0EB5-9545-974C-3EF0760E2B30}" type="datetimeFigureOut">
               <a:rPr lang="en-US" smtClean="0"/>
-              <a:t>2/13/15</a:t>
+              <a:t>2/16/15</a:t>
             </a:fld>
             <a:endParaRPr lang="en-US"/>
           </a:p>
@@ -1741,7 +1745,7 @@
           <a:p>
             <a:fld id="{FD8F7154-0EB5-9545-974C-3EF0760E2B30}" type="datetimeFigureOut">
               <a:rPr lang="en-US" smtClean="0"/>
-              <a:t>2/13/15</a:t>
+              <a:t>2/16/15</a:t>
             </a:fld>
             <a:endParaRPr lang="en-US"/>
           </a:p>
@@ -1921,7 +1925,7 @@
           <a:p>
             <a:fld id="{FD8F7154-0EB5-9545-974C-3EF0760E2B30}" type="datetimeFigureOut">
               <a:rPr lang="en-US" smtClean="0"/>
-              <a:t>2/13/15</a:t>
+              <a:t>2/16/15</a:t>
             </a:fld>
             <a:endParaRPr lang="en-US"/>
           </a:p>
@@ -2091,7 +2095,7 @@
           <a:p>
             <a:fld id="{FD8F7154-0EB5-9545-974C-3EF0760E2B30}" type="datetimeFigureOut">
               <a:rPr lang="en-US" smtClean="0"/>
-              <a:t>2/13/15</a:t>
+              <a:t>2/16/15</a:t>
             </a:fld>
             <a:endParaRPr lang="en-US"/>
           </a:p>
@@ -2337,7 +2341,7 @@
           <a:p>
             <a:fld id="{FD8F7154-0EB5-9545-974C-3EF0760E2B30}" type="datetimeFigureOut">
               <a:rPr lang="en-US" smtClean="0"/>
-              <a:t>2/13/15</a:t>
+              <a:t>2/16/15</a:t>
             </a:fld>
             <a:endParaRPr lang="en-US"/>
           </a:p>
@@ -2625,7 +2629,7 @@
           <a:p>
             <a:fld id="{FD8F7154-0EB5-9545-974C-3EF0760E2B30}" type="datetimeFigureOut">
               <a:rPr lang="en-US" smtClean="0"/>
-              <a:t>2/13/15</a:t>
+              <a:t>2/16/15</a:t>
             </a:fld>
             <a:endParaRPr lang="en-US"/>
           </a:p>
@@ -3047,7 +3051,7 @@
           <a:p>
             <a:fld id="{FD8F7154-0EB5-9545-974C-3EF0760E2B30}" type="datetimeFigureOut">
               <a:rPr lang="en-US" smtClean="0"/>
-              <a:t>2/13/15</a:t>
+              <a:t>2/16/15</a:t>
             </a:fld>
             <a:endParaRPr lang="en-US"/>
           </a:p>
@@ -3165,7 +3169,7 @@
           <a:p>
             <a:fld id="{FD8F7154-0EB5-9545-974C-3EF0760E2B30}" type="datetimeFigureOut">
               <a:rPr lang="en-US" smtClean="0"/>
-              <a:t>2/13/15</a:t>
+              <a:t>2/16/15</a:t>
             </a:fld>
             <a:endParaRPr lang="en-US"/>
           </a:p>
@@ -3260,7 +3264,7 @@
           <a:p>
             <a:fld id="{FD8F7154-0EB5-9545-974C-3EF0760E2B30}" type="datetimeFigureOut">
               <a:rPr lang="en-US" smtClean="0"/>
-              <a:t>2/13/15</a:t>
+              <a:t>2/16/15</a:t>
             </a:fld>
             <a:endParaRPr lang="en-US"/>
           </a:p>
@@ -3537,7 +3541,7 @@
           <a:p>
             <a:fld id="{FD8F7154-0EB5-9545-974C-3EF0760E2B30}" type="datetimeFigureOut">
               <a:rPr lang="en-US" smtClean="0"/>
-              <a:t>2/13/15</a:t>
+              <a:t>2/16/15</a:t>
             </a:fld>
             <a:endParaRPr lang="en-US"/>
           </a:p>
@@ -3790,7 +3794,7 @@
           <a:p>
             <a:fld id="{FD8F7154-0EB5-9545-974C-3EF0760E2B30}" type="datetimeFigureOut">
               <a:rPr lang="en-US" smtClean="0"/>
-              <a:t>2/13/15</a:t>
+              <a:t>2/16/15</a:t>
             </a:fld>
             <a:endParaRPr lang="en-US"/>
           </a:p>
@@ -4003,7 +4007,7 @@
           <a:p>
             <a:fld id="{FD8F7154-0EB5-9545-974C-3EF0760E2B30}" type="datetimeFigureOut">
               <a:rPr lang="en-US" smtClean="0"/>
-              <a:t>2/13/15</a:t>
+              <a:t>2/16/15</a:t>
             </a:fld>
             <a:endParaRPr lang="en-US"/>
           </a:p>
@@ -4543,7 +4547,7 @@
             </a:r>
             <a:r>
               <a:rPr lang="en-US" baseline="0" dirty="0" smtClean="0"/>
-              <a:t> Mixed Mixed Context</a:t>
+              <a:t> Mixed Context</a:t>
             </a:r>
             <a:endParaRPr lang="en-US" dirty="0"/>
           </a:p>
@@ -4564,7 +4568,7 @@
           <a:bodyPr/>
           <a:lstStyle/>
           <a:p>
-            <a:endParaRPr lang="en-US"/>
+            <a:endParaRPr lang="en-US" dirty="0"/>
           </a:p>
         </p:txBody>
       </p:sp>
@@ -4615,7 +4619,15 @@
           <a:p>
             <a:r>
               <a:rPr lang="en-US" dirty="0" smtClean="0"/>
-              <a:t>Pattern: MCDLT Pattern</a:t>
+              <a:t>Does</a:t>
+            </a:r>
+            <a:r>
+              <a:rPr lang="en-US" baseline="0" dirty="0" smtClean="0"/>
+              <a:t> it </a:t>
+            </a:r>
+            <a:r>
+              <a:rPr lang="en-US" baseline="0" dirty="0" smtClean="0"/>
+              <a:t>Work?</a:t>
             </a:r>
             <a:endParaRPr lang="en-US" dirty="0"/>
           </a:p>
@@ -4636,14 +4648,20 @@
           <a:bodyPr/>
           <a:lstStyle/>
           <a:p>
-            <a:endParaRPr lang="en-US"/>
+            <a:pPr marL="0" indent="0">
+              <a:buNone/>
+            </a:pPr>
+            <a:r>
+              <a:rPr lang="en-US" dirty="0" smtClean="0"/>
+              <a:t>Yes!</a:t>
+            </a:r>
           </a:p>
         </p:txBody>
       </p:sp>
     </p:spTree>
     <p:extLst>
       <p:ext uri="{BB962C8B-B14F-4D97-AF65-F5344CB8AC3E}">
-        <p14:creationId xmlns:p14="http://schemas.microsoft.com/office/powerpoint/2010/main" val="1068404250"/>
+        <p14:creationId xmlns:p14="http://schemas.microsoft.com/office/powerpoint/2010/main" val="2442150392"/>
       </p:ext>
     </p:extLst>
   </p:cSld>
@@ -4687,7 +4705,15 @@
           <a:p>
             <a:r>
               <a:rPr lang="en-US" dirty="0" smtClean="0"/>
-              <a:t>Example Application: Context Hell</a:t>
+              <a:t>Is it </a:t>
+            </a:r>
+            <a:r>
+              <a:rPr lang="en-US" dirty="0" smtClean="0"/>
+              <a:t>Secure</a:t>
+            </a:r>
+            <a:r>
+              <a:rPr lang="en-US" dirty="0" smtClean="0"/>
+              <a:t>?</a:t>
             </a:r>
             <a:endParaRPr lang="en-US" dirty="0"/>
           </a:p>
@@ -4711,14 +4737,18 @@
             <a:pPr marL="0" indent="0">
               <a:buNone/>
             </a:pPr>
-            <a:endParaRPr lang="en-US" dirty="0" smtClean="0"/>
+            <a:r>
+              <a:rPr lang="en-US" dirty="0" smtClean="0"/>
+              <a:t>Well… </a:t>
+            </a:r>
+            <a:endParaRPr lang="en-US" dirty="0"/>
           </a:p>
         </p:txBody>
       </p:sp>
     </p:spTree>
     <p:extLst>
       <p:ext uri="{BB962C8B-B14F-4D97-AF65-F5344CB8AC3E}">
-        <p14:creationId xmlns:p14="http://schemas.microsoft.com/office/powerpoint/2010/main" val="4019317055"/>
+        <p14:creationId xmlns:p14="http://schemas.microsoft.com/office/powerpoint/2010/main" val="2459304027"/>
       </p:ext>
     </p:extLst>
   </p:cSld>
@@ -4762,11 +4792,7 @@
           <a:p>
             <a:r>
               <a:rPr lang="en-US" dirty="0" smtClean="0"/>
-              <a:t>Anti Pattern:</a:t>
-            </a:r>
-            <a:r>
-              <a:rPr lang="en-US" baseline="0" dirty="0" smtClean="0"/>
-              <a:t> Breaking the Stack</a:t>
+              <a:t>Pattern: MCDLT Pattern</a:t>
             </a:r>
             <a:endParaRPr lang="en-US" dirty="0"/>
           </a:p>
@@ -4794,7 +4820,7 @@
     </p:spTree>
     <p:extLst>
       <p:ext uri="{BB962C8B-B14F-4D97-AF65-F5344CB8AC3E}">
-        <p14:creationId xmlns:p14="http://schemas.microsoft.com/office/powerpoint/2010/main" val="933988275"/>
+        <p14:creationId xmlns:p14="http://schemas.microsoft.com/office/powerpoint/2010/main" val="1068404250"/>
       </p:ext>
     </p:extLst>
   </p:cSld>
@@ -4838,11 +4864,15 @@
           <a:p>
             <a:r>
               <a:rPr lang="en-US" dirty="0" smtClean="0"/>
-              <a:t>Pattern: "Provable"</a:t>
+              <a:t>Does</a:t>
             </a:r>
             <a:r>
               <a:rPr lang="en-US" baseline="0" dirty="0" smtClean="0"/>
-              <a:t> Security</a:t>
+              <a:t> it </a:t>
+            </a:r>
+            <a:r>
+              <a:rPr lang="en-US" baseline="0" dirty="0" smtClean="0"/>
+              <a:t>Work?</a:t>
             </a:r>
             <a:endParaRPr lang="en-US" dirty="0"/>
           </a:p>
@@ -4863,14 +4893,20 @@
           <a:bodyPr/>
           <a:lstStyle/>
           <a:p>
-            <a:endParaRPr lang="en-US"/>
+            <a:pPr marL="0" indent="0">
+              <a:buNone/>
+            </a:pPr>
+            <a:r>
+              <a:rPr lang="en-US" dirty="0" smtClean="0"/>
+              <a:t>Yes!</a:t>
+            </a:r>
           </a:p>
         </p:txBody>
       </p:sp>
     </p:spTree>
     <p:extLst>
       <p:ext uri="{BB962C8B-B14F-4D97-AF65-F5344CB8AC3E}">
-        <p14:creationId xmlns:p14="http://schemas.microsoft.com/office/powerpoint/2010/main" val="3017978147"/>
+        <p14:creationId xmlns:p14="http://schemas.microsoft.com/office/powerpoint/2010/main" val="3459138038"/>
       </p:ext>
     </p:extLst>
   </p:cSld>
@@ -4909,14 +4945,20 @@
         </p:nvSpPr>
         <p:spPr/>
         <p:txBody>
-          <a:bodyPr>
-            <a:normAutofit fontScale="90000"/>
-          </a:bodyPr>
+          <a:bodyPr/>
           <a:lstStyle/>
           <a:p>
             <a:r>
               <a:rPr lang="en-US" dirty="0" smtClean="0"/>
-              <a:t>Example Application: Controlling Your Destiny</a:t>
+              <a:t>Is it </a:t>
+            </a:r>
+            <a:r>
+              <a:rPr lang="en-US" dirty="0" smtClean="0"/>
+              <a:t>Secure</a:t>
+            </a:r>
+            <a:r>
+              <a:rPr lang="en-US" dirty="0" smtClean="0"/>
+              <a:t>?</a:t>
             </a:r>
             <a:endParaRPr lang="en-US" dirty="0"/>
           </a:p>
@@ -4937,14 +4979,17 @@
           <a:bodyPr/>
           <a:lstStyle/>
           <a:p>
-            <a:endParaRPr lang="en-US"/>
+            <a:pPr marL="0" indent="0">
+              <a:buNone/>
+            </a:pPr>
+            <a:endParaRPr lang="en-US" dirty="0"/>
           </a:p>
         </p:txBody>
       </p:sp>
     </p:spTree>
     <p:extLst>
       <p:ext uri="{BB962C8B-B14F-4D97-AF65-F5344CB8AC3E}">
-        <p14:creationId xmlns:p14="http://schemas.microsoft.com/office/powerpoint/2010/main" val="3520904702"/>
+        <p14:creationId xmlns:p14="http://schemas.microsoft.com/office/powerpoint/2010/main" val="1869191853"/>
       </p:ext>
     </p:extLst>
   </p:cSld>
@@ -4983,16 +5028,18 @@
         </p:nvSpPr>
         <p:spPr/>
         <p:txBody>
-          <a:bodyPr/>
+          <a:bodyPr>
+            <a:normAutofit fontScale="90000"/>
+          </a:bodyPr>
           <a:lstStyle/>
           <a:p>
             <a:r>
               <a:rPr lang="en-US" dirty="0" smtClean="0"/>
-              <a:t>Does</a:t>
-            </a:r>
-            <a:r>
-              <a:rPr lang="en-US" baseline="0" dirty="0" smtClean="0"/>
-              <a:t> it work</a:t>
+              <a:t>Example Application: </a:t>
+            </a:r>
+            <a:r>
+              <a:rPr lang="en-US" dirty="0" smtClean="0"/>
+              <a:t>Phonebook Context Hell Version</a:t>
             </a:r>
             <a:endParaRPr lang="en-US" dirty="0"/>
           </a:p>
@@ -5016,17 +5063,14 @@
             <a:pPr marL="0" indent="0">
               <a:buNone/>
             </a:pPr>
-            <a:r>
-              <a:rPr lang="en-US" dirty="0" smtClean="0"/>
-              <a:t>Yes!</a:t>
-            </a:r>
+            <a:endParaRPr lang="en-US" dirty="0" smtClean="0"/>
           </a:p>
         </p:txBody>
       </p:sp>
     </p:spTree>
     <p:extLst>
       <p:ext uri="{BB962C8B-B14F-4D97-AF65-F5344CB8AC3E}">
-        <p14:creationId xmlns:p14="http://schemas.microsoft.com/office/powerpoint/2010/main" val="582972790"/>
+        <p14:creationId xmlns:p14="http://schemas.microsoft.com/office/powerpoint/2010/main" val="4019317055"/>
       </p:ext>
     </p:extLst>
   </p:cSld>
@@ -5065,12 +5109,26 @@
         </p:nvSpPr>
         <p:spPr/>
         <p:txBody>
-          <a:bodyPr/>
+          <a:bodyPr>
+            <a:normAutofit fontScale="90000"/>
+          </a:bodyPr>
           <a:lstStyle/>
           <a:p>
             <a:r>
               <a:rPr lang="en-US" dirty="0" smtClean="0"/>
-              <a:t>Is it Secure?</a:t>
+              <a:t>Example Application:</a:t>
+            </a:r>
+            <a:r>
+              <a:rPr lang="en-US" baseline="0" dirty="0" smtClean="0"/>
+              <a:t> </a:t>
+            </a:r>
+            <a:r>
+              <a:rPr lang="en-US" baseline="0" dirty="0" smtClean="0"/>
+              <a:t>Phone with Context </a:t>
+            </a:r>
+            <a:r>
+              <a:rPr lang="en-US" baseline="0" dirty="0" smtClean="0"/>
+              <a:t>Seams</a:t>
             </a:r>
             <a:endParaRPr lang="en-US" dirty="0"/>
           </a:p>
@@ -5094,10 +5152,6 @@
             <a:pPr marL="0" indent="0">
               <a:buNone/>
             </a:pPr>
-            <a:r>
-              <a:rPr lang="en-US" dirty="0" smtClean="0"/>
-              <a:t>Well… I think so.</a:t>
-            </a:r>
             <a:endParaRPr lang="en-US" dirty="0"/>
           </a:p>
         </p:txBody>
@@ -5105,7 +5159,7 @@
     </p:spTree>
     <p:extLst>
       <p:ext uri="{BB962C8B-B14F-4D97-AF65-F5344CB8AC3E}">
-        <p14:creationId xmlns:p14="http://schemas.microsoft.com/office/powerpoint/2010/main" val="2449586381"/>
+        <p14:creationId xmlns:p14="http://schemas.microsoft.com/office/powerpoint/2010/main" val="655443441"/>
       </p:ext>
     </p:extLst>
   </p:cSld>
@@ -5144,18 +5198,16 @@
         </p:nvSpPr>
         <p:spPr/>
         <p:txBody>
-          <a:bodyPr>
-            <a:normAutofit fontScale="90000"/>
-          </a:bodyPr>
+          <a:bodyPr/>
           <a:lstStyle/>
           <a:p>
             <a:r>
               <a:rPr lang="en-US" dirty="0" smtClean="0"/>
-              <a:t>Example Application:</a:t>
+              <a:t>Anti Pattern:</a:t>
             </a:r>
             <a:r>
               <a:rPr lang="en-US" baseline="0" dirty="0" smtClean="0"/>
-              <a:t> Context Seams</a:t>
+              <a:t> Breaking the Stack</a:t>
             </a:r>
             <a:endParaRPr lang="en-US" dirty="0"/>
           </a:p>
@@ -5176,14 +5228,14 @@
           <a:bodyPr/>
           <a:lstStyle/>
           <a:p>
-            <a:endParaRPr lang="en-US"/>
+            <a:endParaRPr lang="en-US" dirty="0"/>
           </a:p>
         </p:txBody>
       </p:sp>
     </p:spTree>
     <p:extLst>
       <p:ext uri="{BB962C8B-B14F-4D97-AF65-F5344CB8AC3E}">
-        <p14:creationId xmlns:p14="http://schemas.microsoft.com/office/powerpoint/2010/main" val="1184085314"/>
+        <p14:creationId xmlns:p14="http://schemas.microsoft.com/office/powerpoint/2010/main" val="933988275"/>
       </p:ext>
     </p:extLst>
   </p:cSld>
@@ -5294,18 +5346,16 @@
         </p:nvSpPr>
         <p:spPr/>
         <p:txBody>
-          <a:bodyPr>
-            <a:normAutofit fontScale="90000"/>
-          </a:bodyPr>
+          <a:bodyPr/>
           <a:lstStyle/>
           <a:p>
             <a:r>
               <a:rPr lang="en-US" dirty="0" smtClean="0"/>
-              <a:t>--- Section 2: Organizational Patterns</a:t>
+              <a:t>Pattern: "Provable"</a:t>
             </a:r>
             <a:r>
               <a:rPr lang="en-US" baseline="0" dirty="0" smtClean="0"/>
-              <a:t> ----</a:t>
+              <a:t> Security</a:t>
             </a:r>
             <a:endParaRPr lang="en-US" dirty="0"/>
           </a:p>
@@ -5333,7 +5383,7 @@
     </p:spTree>
     <p:extLst>
       <p:ext uri="{BB962C8B-B14F-4D97-AF65-F5344CB8AC3E}">
-        <p14:creationId xmlns:p14="http://schemas.microsoft.com/office/powerpoint/2010/main" val="2406960158"/>
+        <p14:creationId xmlns:p14="http://schemas.microsoft.com/office/powerpoint/2010/main" val="3017978147"/>
       </p:ext>
     </p:extLst>
   </p:cSld>
@@ -5373,15 +5423,21 @@
         <p:spPr/>
         <p:txBody>
           <a:bodyPr>
-            <a:normAutofit/>
+            <a:normAutofit fontScale="90000"/>
           </a:bodyPr>
           <a:lstStyle/>
           <a:p>
+            <a:pPr marL="0" indent="0">
+              <a:buNone/>
+            </a:pPr>
             <a:r>
               <a:rPr lang="en-US" dirty="0" smtClean="0"/>
-              <a:t>Patterns in People (Organizational)</a:t>
-            </a:r>
-            <a:endParaRPr lang="en-US" dirty="0"/>
+              <a:t>Example Application: Controlling Your </a:t>
+            </a:r>
+            <a:r>
+              <a:rPr lang="en-US" dirty="0" smtClean="0"/>
+              <a:t>Destiny</a:t>
+            </a:r>
           </a:p>
         </p:txBody>
       </p:sp>
@@ -5400,14 +5456,17 @@
           <a:bodyPr/>
           <a:lstStyle/>
           <a:p>
-            <a:endParaRPr lang="en-US" dirty="0"/>
+            <a:pPr marL="0" indent="0">
+              <a:buNone/>
+            </a:pPr>
+            <a:endParaRPr lang="en-US" smtClean="0"/>
           </a:p>
         </p:txBody>
       </p:sp>
     </p:spTree>
     <p:extLst>
       <p:ext uri="{BB962C8B-B14F-4D97-AF65-F5344CB8AC3E}">
-        <p14:creationId xmlns:p14="http://schemas.microsoft.com/office/powerpoint/2010/main" val="81657338"/>
+        <p14:creationId xmlns:p14="http://schemas.microsoft.com/office/powerpoint/2010/main" val="3520904702"/>
       </p:ext>
     </p:extLst>
   </p:cSld>
@@ -5449,10 +5508,13 @@
           <a:bodyPr/>
           <a:lstStyle/>
           <a:p>
-            <a:pPr lvl="0"/>
+            <a:r>
+              <a:rPr lang="en-US" dirty="0" smtClean="0"/>
+              <a:t>Anti-Pattern:</a:t>
+            </a:r>
             <a:r>
               <a:rPr lang="en-US" baseline="0" dirty="0" smtClean="0"/>
-              <a:t>Anti-pattern: Business Vacuum</a:t>
+              <a:t> Lock it Down</a:t>
             </a:r>
             <a:endParaRPr lang="en-US" dirty="0"/>
           </a:p>
@@ -5480,7 +5542,7 @@
     </p:spTree>
     <p:extLst>
       <p:ext uri="{BB962C8B-B14F-4D97-AF65-F5344CB8AC3E}">
-        <p14:creationId xmlns:p14="http://schemas.microsoft.com/office/powerpoint/2010/main" val="2946472026"/>
+        <p14:creationId xmlns:p14="http://schemas.microsoft.com/office/powerpoint/2010/main" val="1282280919"/>
       </p:ext>
     </p:extLst>
   </p:cSld>
@@ -5519,22 +5581,16 @@
         </p:nvSpPr>
         <p:spPr/>
         <p:txBody>
-          <a:bodyPr>
-            <a:normAutofit/>
-          </a:bodyPr>
+          <a:bodyPr/>
           <a:lstStyle/>
           <a:p>
             <a:r>
               <a:rPr lang="en-US" dirty="0" smtClean="0"/>
-              <a:t>Anti-pattern:</a:t>
+              <a:t>Pattern:</a:t>
             </a:r>
             <a:r>
               <a:rPr lang="en-US" baseline="0" dirty="0" smtClean="0"/>
-              <a:t> </a:t>
-            </a:r>
-            <a:r>
-              <a:rPr lang="en-US" dirty="0" smtClean="0"/>
-              <a:t>Security Sandwich</a:t>
+              <a:t> Open it Up</a:t>
             </a:r>
             <a:endParaRPr lang="en-US" dirty="0"/>
           </a:p>
@@ -5555,33 +5611,14 @@
           <a:bodyPr/>
           <a:lstStyle/>
           <a:p>
-            <a:r>
-              <a:rPr lang="en-US" dirty="0" smtClean="0"/>
-              <a:t>Security</a:t>
-            </a:r>
-            <a:r>
-              <a:rPr lang="en-US" baseline="0" dirty="0" smtClean="0"/>
-              <a:t> Sandwich</a:t>
-            </a:r>
-          </a:p>
-          <a:p>
-            <a:r>
-              <a:rPr lang="en-US" baseline="0" dirty="0" smtClean="0"/>
-              <a:t>Open-Faced Security Sandwich</a:t>
-            </a:r>
-          </a:p>
-          <a:p>
-            <a:r>
-              <a:rPr lang="en-US" baseline="0" dirty="0" smtClean="0"/>
-              <a:t>Security Sandwich, Low Carb Version</a:t>
-            </a:r>
+            <a:endParaRPr lang="en-US"/>
           </a:p>
         </p:txBody>
       </p:sp>
     </p:spTree>
     <p:extLst>
       <p:ext uri="{BB962C8B-B14F-4D97-AF65-F5344CB8AC3E}">
-        <p14:creationId xmlns:p14="http://schemas.microsoft.com/office/powerpoint/2010/main" val="1968783290"/>
+        <p14:creationId xmlns:p14="http://schemas.microsoft.com/office/powerpoint/2010/main" val="1690365460"/>
       </p:ext>
     </p:extLst>
   </p:cSld>
@@ -5620,16 +5657,18 @@
         </p:nvSpPr>
         <p:spPr/>
         <p:txBody>
-          <a:bodyPr/>
+          <a:bodyPr>
+            <a:normAutofit fontScale="90000"/>
+          </a:bodyPr>
           <a:lstStyle/>
           <a:p>
             <a:r>
               <a:rPr lang="en-US" dirty="0" smtClean="0"/>
-              <a:t>Pattern:</a:t>
+              <a:t>--- Section 2: Organizational Patterns</a:t>
             </a:r>
             <a:r>
               <a:rPr lang="en-US" baseline="0" dirty="0" smtClean="0"/>
-              <a:t> SDLC Integration</a:t>
+              <a:t> ----</a:t>
             </a:r>
             <a:endParaRPr lang="en-US" dirty="0"/>
           </a:p>
@@ -5657,7 +5696,7 @@
     </p:spTree>
     <p:extLst>
       <p:ext uri="{BB962C8B-B14F-4D97-AF65-F5344CB8AC3E}">
-        <p14:creationId xmlns:p14="http://schemas.microsoft.com/office/powerpoint/2010/main" val="2646128052"/>
+        <p14:creationId xmlns:p14="http://schemas.microsoft.com/office/powerpoint/2010/main" val="2406960158"/>
       </p:ext>
     </p:extLst>
   </p:cSld>
@@ -5696,16 +5735,14 @@
         </p:nvSpPr>
         <p:spPr/>
         <p:txBody>
-          <a:bodyPr/>
+          <a:bodyPr>
+            <a:normAutofit/>
+          </a:bodyPr>
           <a:lstStyle/>
           <a:p>
             <a:r>
               <a:rPr lang="en-US" dirty="0" smtClean="0"/>
-              <a:t>--- Section 3: Blue Sky</a:t>
-            </a:r>
-            <a:r>
-              <a:rPr lang="en-US" baseline="0" dirty="0" smtClean="0"/>
-              <a:t> ---</a:t>
+              <a:t>Patterns in People (Organizational)</a:t>
             </a:r>
             <a:endParaRPr lang="en-US" dirty="0"/>
           </a:p>
@@ -5726,14 +5763,14 @@
           <a:bodyPr/>
           <a:lstStyle/>
           <a:p>
-            <a:endParaRPr lang="en-US"/>
+            <a:endParaRPr lang="en-US" dirty="0"/>
           </a:p>
         </p:txBody>
       </p:sp>
     </p:spTree>
     <p:extLst>
       <p:ext uri="{BB962C8B-B14F-4D97-AF65-F5344CB8AC3E}">
-        <p14:creationId xmlns:p14="http://schemas.microsoft.com/office/powerpoint/2010/main" val="2351261104"/>
+        <p14:creationId xmlns:p14="http://schemas.microsoft.com/office/powerpoint/2010/main" val="81657338"/>
       </p:ext>
     </p:extLst>
   </p:cSld>
@@ -5775,13 +5812,10 @@
           <a:bodyPr/>
           <a:lstStyle/>
           <a:p>
-            <a:r>
-              <a:rPr lang="en-US" dirty="0" smtClean="0"/>
-              <a:t>Blue Sky</a:t>
-            </a:r>
+            <a:pPr lvl="0"/>
             <a:r>
               <a:rPr lang="en-US" baseline="0" dirty="0" smtClean="0"/>
-              <a:t> …</a:t>
+              <a:t>Anti-pattern: Business Vacuum</a:t>
             </a:r>
             <a:endParaRPr lang="en-US" dirty="0"/>
           </a:p>
@@ -5809,7 +5843,7 @@
     </p:spTree>
     <p:extLst>
       <p:ext uri="{BB962C8B-B14F-4D97-AF65-F5344CB8AC3E}">
-        <p14:creationId xmlns:p14="http://schemas.microsoft.com/office/powerpoint/2010/main" val="780004726"/>
+        <p14:creationId xmlns:p14="http://schemas.microsoft.com/office/powerpoint/2010/main" val="2946472026"/>
       </p:ext>
     </p:extLst>
   </p:cSld>
@@ -5848,12 +5882,22 @@
         </p:nvSpPr>
         <p:spPr/>
         <p:txBody>
-          <a:bodyPr/>
+          <a:bodyPr>
+            <a:normAutofit/>
+          </a:bodyPr>
           <a:lstStyle/>
           <a:p>
             <a:r>
               <a:rPr lang="en-US" dirty="0" smtClean="0"/>
-              <a:t>HDD Security</a:t>
+              <a:t>Anti-pattern:</a:t>
+            </a:r>
+            <a:r>
+              <a:rPr lang="en-US" baseline="0" dirty="0" smtClean="0"/>
+              <a:t> </a:t>
+            </a:r>
+            <a:r>
+              <a:rPr lang="en-US" dirty="0" smtClean="0"/>
+              <a:t>Security Sandwich</a:t>
             </a:r>
             <a:endParaRPr lang="en-US" dirty="0"/>
           </a:p>
@@ -5874,14 +5918,33 @@
           <a:bodyPr/>
           <a:lstStyle/>
           <a:p>
-            <a:endParaRPr lang="en-US"/>
+            <a:r>
+              <a:rPr lang="en-US" dirty="0" smtClean="0"/>
+              <a:t>Security</a:t>
+            </a:r>
+            <a:r>
+              <a:rPr lang="en-US" baseline="0" dirty="0" smtClean="0"/>
+              <a:t> Sandwich</a:t>
+            </a:r>
+          </a:p>
+          <a:p>
+            <a:r>
+              <a:rPr lang="en-US" baseline="0" dirty="0" smtClean="0"/>
+              <a:t>Open-Faced Security Sandwich</a:t>
+            </a:r>
+          </a:p>
+          <a:p>
+            <a:r>
+              <a:rPr lang="en-US" baseline="0" dirty="0" smtClean="0"/>
+              <a:t>Security Sandwich, Low Carb Version</a:t>
+            </a:r>
           </a:p>
         </p:txBody>
       </p:sp>
     </p:spTree>
     <p:extLst>
       <p:ext uri="{BB962C8B-B14F-4D97-AF65-F5344CB8AC3E}">
-        <p14:creationId xmlns:p14="http://schemas.microsoft.com/office/powerpoint/2010/main" val="1759136688"/>
+        <p14:creationId xmlns:p14="http://schemas.microsoft.com/office/powerpoint/2010/main" val="1968783290"/>
       </p:ext>
     </p:extLst>
   </p:cSld>
@@ -5925,11 +5988,11 @@
           <a:p>
             <a:r>
               <a:rPr lang="en-US" dirty="0" smtClean="0"/>
-              <a:t>Holistic</a:t>
+              <a:t>Pattern:</a:t>
             </a:r>
             <a:r>
               <a:rPr lang="en-US" baseline="0" dirty="0" smtClean="0"/>
-              <a:t> Monitoring</a:t>
+              <a:t> SDLC Integration</a:t>
             </a:r>
             <a:endParaRPr lang="en-US" dirty="0"/>
           </a:p>
@@ -5957,7 +6020,83 @@
     </p:spTree>
     <p:extLst>
       <p:ext uri="{BB962C8B-B14F-4D97-AF65-F5344CB8AC3E}">
-        <p14:creationId xmlns:p14="http://schemas.microsoft.com/office/powerpoint/2010/main" val="470547494"/>
+        <p14:creationId xmlns:p14="http://schemas.microsoft.com/office/powerpoint/2010/main" val="2646128052"/>
+      </p:ext>
+    </p:extLst>
+  </p:cSld>
+  <p:clrMapOvr>
+    <a:masterClrMapping/>
+  </p:clrMapOvr>
+</p:sld>
+</file>
+
+<file path=ppt/slides/slide29.xml><?xml version="1.0" encoding="utf-8"?>
+<p:sld xmlns:a="http://schemas.openxmlformats.org/drawingml/2006/main" xmlns:r="http://schemas.openxmlformats.org/officeDocument/2006/relationships" xmlns:p="http://schemas.openxmlformats.org/presentationml/2006/main">
+  <p:cSld>
+    <p:spTree>
+      <p:nvGrpSpPr>
+        <p:cNvPr id="1" name=""/>
+        <p:cNvGrpSpPr/>
+        <p:nvPr/>
+      </p:nvGrpSpPr>
+      <p:grpSpPr>
+        <a:xfrm>
+          <a:off x="0" y="0"/>
+          <a:ext cx="0" cy="0"/>
+          <a:chOff x="0" y="0"/>
+          <a:chExt cx="0" cy="0"/>
+        </a:xfrm>
+      </p:grpSpPr>
+      <p:sp>
+        <p:nvSpPr>
+          <p:cNvPr id="2" name="Title 1"/>
+          <p:cNvSpPr>
+            <a:spLocks noGrp="1"/>
+          </p:cNvSpPr>
+          <p:nvPr>
+            <p:ph type="title"/>
+          </p:nvPr>
+        </p:nvSpPr>
+        <p:spPr/>
+        <p:txBody>
+          <a:bodyPr/>
+          <a:lstStyle/>
+          <a:p>
+            <a:r>
+              <a:rPr lang="en-US" dirty="0" smtClean="0"/>
+              <a:t>--- Section 3: Blue Sky</a:t>
+            </a:r>
+            <a:r>
+              <a:rPr lang="en-US" baseline="0" dirty="0" smtClean="0"/>
+              <a:t> ---</a:t>
+            </a:r>
+            <a:endParaRPr lang="en-US" dirty="0"/>
+          </a:p>
+        </p:txBody>
+      </p:sp>
+      <p:sp>
+        <p:nvSpPr>
+          <p:cNvPr id="3" name="Content Placeholder 2"/>
+          <p:cNvSpPr>
+            <a:spLocks noGrp="1"/>
+          </p:cNvSpPr>
+          <p:nvPr>
+            <p:ph idx="1"/>
+          </p:nvPr>
+        </p:nvSpPr>
+        <p:spPr/>
+        <p:txBody>
+          <a:bodyPr/>
+          <a:lstStyle/>
+          <a:p>
+            <a:endParaRPr lang="en-US"/>
+          </a:p>
+        </p:txBody>
+      </p:sp>
+    </p:spTree>
+    <p:extLst>
+      <p:ext uri="{BB962C8B-B14F-4D97-AF65-F5344CB8AC3E}">
+        <p14:creationId xmlns:p14="http://schemas.microsoft.com/office/powerpoint/2010/main" val="2351261104"/>
       </p:ext>
     </p:extLst>
   </p:cSld>
@@ -6030,6 +6169,230 @@
     <p:extLst>
       <p:ext uri="{BB962C8B-B14F-4D97-AF65-F5344CB8AC3E}">
         <p14:creationId xmlns:p14="http://schemas.microsoft.com/office/powerpoint/2010/main" val="1435700170"/>
+      </p:ext>
+    </p:extLst>
+  </p:cSld>
+  <p:clrMapOvr>
+    <a:masterClrMapping/>
+  </p:clrMapOvr>
+</p:sld>
+</file>
+
+<file path=ppt/slides/slide30.xml><?xml version="1.0" encoding="utf-8"?>
+<p:sld xmlns:a="http://schemas.openxmlformats.org/drawingml/2006/main" xmlns:r="http://schemas.openxmlformats.org/officeDocument/2006/relationships" xmlns:p="http://schemas.openxmlformats.org/presentationml/2006/main">
+  <p:cSld>
+    <p:spTree>
+      <p:nvGrpSpPr>
+        <p:cNvPr id="1" name=""/>
+        <p:cNvGrpSpPr/>
+        <p:nvPr/>
+      </p:nvGrpSpPr>
+      <p:grpSpPr>
+        <a:xfrm>
+          <a:off x="0" y="0"/>
+          <a:ext cx="0" cy="0"/>
+          <a:chOff x="0" y="0"/>
+          <a:chExt cx="0" cy="0"/>
+        </a:xfrm>
+      </p:grpSpPr>
+      <p:sp>
+        <p:nvSpPr>
+          <p:cNvPr id="2" name="Title 1"/>
+          <p:cNvSpPr>
+            <a:spLocks noGrp="1"/>
+          </p:cNvSpPr>
+          <p:nvPr>
+            <p:ph type="title"/>
+          </p:nvPr>
+        </p:nvSpPr>
+        <p:spPr/>
+        <p:txBody>
+          <a:bodyPr/>
+          <a:lstStyle/>
+          <a:p>
+            <a:r>
+              <a:rPr lang="en-US" dirty="0" smtClean="0"/>
+              <a:t>Blue Sky</a:t>
+            </a:r>
+            <a:r>
+              <a:rPr lang="en-US" baseline="0" dirty="0" smtClean="0"/>
+              <a:t> …</a:t>
+            </a:r>
+            <a:endParaRPr lang="en-US" dirty="0"/>
+          </a:p>
+        </p:txBody>
+      </p:sp>
+      <p:sp>
+        <p:nvSpPr>
+          <p:cNvPr id="3" name="Content Placeholder 2"/>
+          <p:cNvSpPr>
+            <a:spLocks noGrp="1"/>
+          </p:cNvSpPr>
+          <p:nvPr>
+            <p:ph idx="1"/>
+          </p:nvPr>
+        </p:nvSpPr>
+        <p:spPr/>
+        <p:txBody>
+          <a:bodyPr/>
+          <a:lstStyle/>
+          <a:p>
+            <a:endParaRPr lang="en-US"/>
+          </a:p>
+        </p:txBody>
+      </p:sp>
+    </p:spTree>
+    <p:extLst>
+      <p:ext uri="{BB962C8B-B14F-4D97-AF65-F5344CB8AC3E}">
+        <p14:creationId xmlns:p14="http://schemas.microsoft.com/office/powerpoint/2010/main" val="780004726"/>
+      </p:ext>
+    </p:extLst>
+  </p:cSld>
+  <p:clrMapOvr>
+    <a:masterClrMapping/>
+  </p:clrMapOvr>
+</p:sld>
+</file>
+
+<file path=ppt/slides/slide31.xml><?xml version="1.0" encoding="utf-8"?>
+<p:sld xmlns:a="http://schemas.openxmlformats.org/drawingml/2006/main" xmlns:r="http://schemas.openxmlformats.org/officeDocument/2006/relationships" xmlns:p="http://schemas.openxmlformats.org/presentationml/2006/main">
+  <p:cSld>
+    <p:spTree>
+      <p:nvGrpSpPr>
+        <p:cNvPr id="1" name=""/>
+        <p:cNvGrpSpPr/>
+        <p:nvPr/>
+      </p:nvGrpSpPr>
+      <p:grpSpPr>
+        <a:xfrm>
+          <a:off x="0" y="0"/>
+          <a:ext cx="0" cy="0"/>
+          <a:chOff x="0" y="0"/>
+          <a:chExt cx="0" cy="0"/>
+        </a:xfrm>
+      </p:grpSpPr>
+      <p:sp>
+        <p:nvSpPr>
+          <p:cNvPr id="2" name="Title 1"/>
+          <p:cNvSpPr>
+            <a:spLocks noGrp="1"/>
+          </p:cNvSpPr>
+          <p:nvPr>
+            <p:ph type="title"/>
+          </p:nvPr>
+        </p:nvSpPr>
+        <p:spPr/>
+        <p:txBody>
+          <a:bodyPr/>
+          <a:lstStyle/>
+          <a:p>
+            <a:r>
+              <a:rPr lang="en-US" dirty="0" smtClean="0"/>
+              <a:t>HDD Security</a:t>
+            </a:r>
+            <a:endParaRPr lang="en-US" dirty="0"/>
+          </a:p>
+        </p:txBody>
+      </p:sp>
+      <p:sp>
+        <p:nvSpPr>
+          <p:cNvPr id="3" name="Content Placeholder 2"/>
+          <p:cNvSpPr>
+            <a:spLocks noGrp="1"/>
+          </p:cNvSpPr>
+          <p:nvPr>
+            <p:ph idx="1"/>
+          </p:nvPr>
+        </p:nvSpPr>
+        <p:spPr/>
+        <p:txBody>
+          <a:bodyPr/>
+          <a:lstStyle/>
+          <a:p>
+            <a:endParaRPr lang="en-US"/>
+          </a:p>
+        </p:txBody>
+      </p:sp>
+    </p:spTree>
+    <p:extLst>
+      <p:ext uri="{BB962C8B-B14F-4D97-AF65-F5344CB8AC3E}">
+        <p14:creationId xmlns:p14="http://schemas.microsoft.com/office/powerpoint/2010/main" val="1759136688"/>
+      </p:ext>
+    </p:extLst>
+  </p:cSld>
+  <p:clrMapOvr>
+    <a:masterClrMapping/>
+  </p:clrMapOvr>
+</p:sld>
+</file>
+
+<file path=ppt/slides/slide32.xml><?xml version="1.0" encoding="utf-8"?>
+<p:sld xmlns:a="http://schemas.openxmlformats.org/drawingml/2006/main" xmlns:r="http://schemas.openxmlformats.org/officeDocument/2006/relationships" xmlns:p="http://schemas.openxmlformats.org/presentationml/2006/main">
+  <p:cSld>
+    <p:spTree>
+      <p:nvGrpSpPr>
+        <p:cNvPr id="1" name=""/>
+        <p:cNvGrpSpPr/>
+        <p:nvPr/>
+      </p:nvGrpSpPr>
+      <p:grpSpPr>
+        <a:xfrm>
+          <a:off x="0" y="0"/>
+          <a:ext cx="0" cy="0"/>
+          <a:chOff x="0" y="0"/>
+          <a:chExt cx="0" cy="0"/>
+        </a:xfrm>
+      </p:grpSpPr>
+      <p:sp>
+        <p:nvSpPr>
+          <p:cNvPr id="2" name="Title 1"/>
+          <p:cNvSpPr>
+            <a:spLocks noGrp="1"/>
+          </p:cNvSpPr>
+          <p:nvPr>
+            <p:ph type="title"/>
+          </p:nvPr>
+        </p:nvSpPr>
+        <p:spPr/>
+        <p:txBody>
+          <a:bodyPr/>
+          <a:lstStyle/>
+          <a:p>
+            <a:r>
+              <a:rPr lang="en-US" dirty="0" smtClean="0"/>
+              <a:t>Holistic</a:t>
+            </a:r>
+            <a:r>
+              <a:rPr lang="en-US" baseline="0" dirty="0" smtClean="0"/>
+              <a:t> Monitoring</a:t>
+            </a:r>
+            <a:endParaRPr lang="en-US" dirty="0"/>
+          </a:p>
+        </p:txBody>
+      </p:sp>
+      <p:sp>
+        <p:nvSpPr>
+          <p:cNvPr id="3" name="Content Placeholder 2"/>
+          <p:cNvSpPr>
+            <a:spLocks noGrp="1"/>
+          </p:cNvSpPr>
+          <p:nvPr>
+            <p:ph idx="1"/>
+          </p:nvPr>
+        </p:nvSpPr>
+        <p:spPr/>
+        <p:txBody>
+          <a:bodyPr/>
+          <a:lstStyle/>
+          <a:p>
+            <a:endParaRPr lang="en-US"/>
+          </a:p>
+        </p:txBody>
+      </p:sp>
+    </p:spTree>
+    <p:extLst>
+      <p:ext uri="{BB962C8B-B14F-4D97-AF65-F5344CB8AC3E}">
+        <p14:creationId xmlns:p14="http://schemas.microsoft.com/office/powerpoint/2010/main" val="470547494"/>
       </p:ext>
     </p:extLst>
   </p:cSld>

</xml_diff>

<commit_message>
Work on steps. Ready to go to lower level tests.
</commit_message>
<xml_diff>
--- a/deck/Dev Nexus Presentation.pptx
+++ b/deck/Dev Nexus Presentation.pptx
@@ -5,7 +5,7 @@
     <p:sldMasterId id="2147483648" r:id="rId1"/>
   </p:sldMasterIdLst>
   <p:notesMasterIdLst>
-    <p:notesMasterId r:id="rId34"/>
+    <p:notesMasterId r:id="rId35"/>
   </p:notesMasterIdLst>
   <p:sldIdLst>
     <p:sldId id="256" r:id="rId2"/>
@@ -15,31 +15,32 @@
     <p:sldId id="272" r:id="rId6"/>
     <p:sldId id="258" r:id="rId7"/>
     <p:sldId id="275" r:id="rId8"/>
-    <p:sldId id="259" r:id="rId9"/>
-    <p:sldId id="277" r:id="rId10"/>
-    <p:sldId id="260" r:id="rId11"/>
-    <p:sldId id="280" r:id="rId12"/>
-    <p:sldId id="293" r:id="rId13"/>
-    <p:sldId id="294" r:id="rId14"/>
-    <p:sldId id="287" r:id="rId15"/>
-    <p:sldId id="296" r:id="rId16"/>
-    <p:sldId id="297" r:id="rId17"/>
-    <p:sldId id="263" r:id="rId18"/>
-    <p:sldId id="299" r:id="rId19"/>
-    <p:sldId id="288" r:id="rId20"/>
-    <p:sldId id="289" r:id="rId21"/>
-    <p:sldId id="290" r:id="rId22"/>
-    <p:sldId id="300" r:id="rId23"/>
-    <p:sldId id="301" r:id="rId24"/>
-    <p:sldId id="278" r:id="rId25"/>
-    <p:sldId id="261" r:id="rId26"/>
-    <p:sldId id="286" r:id="rId27"/>
-    <p:sldId id="267" r:id="rId28"/>
-    <p:sldId id="285" r:id="rId29"/>
-    <p:sldId id="282" r:id="rId30"/>
-    <p:sldId id="262" r:id="rId31"/>
-    <p:sldId id="269" r:id="rId32"/>
-    <p:sldId id="270" r:id="rId33"/>
+    <p:sldId id="302" r:id="rId9"/>
+    <p:sldId id="259" r:id="rId10"/>
+    <p:sldId id="277" r:id="rId11"/>
+    <p:sldId id="260" r:id="rId12"/>
+    <p:sldId id="280" r:id="rId13"/>
+    <p:sldId id="293" r:id="rId14"/>
+    <p:sldId id="294" r:id="rId15"/>
+    <p:sldId id="287" r:id="rId16"/>
+    <p:sldId id="296" r:id="rId17"/>
+    <p:sldId id="297" r:id="rId18"/>
+    <p:sldId id="263" r:id="rId19"/>
+    <p:sldId id="299" r:id="rId20"/>
+    <p:sldId id="288" r:id="rId21"/>
+    <p:sldId id="289" r:id="rId22"/>
+    <p:sldId id="290" r:id="rId23"/>
+    <p:sldId id="300" r:id="rId24"/>
+    <p:sldId id="301" r:id="rId25"/>
+    <p:sldId id="278" r:id="rId26"/>
+    <p:sldId id="261" r:id="rId27"/>
+    <p:sldId id="286" r:id="rId28"/>
+    <p:sldId id="267" r:id="rId29"/>
+    <p:sldId id="285" r:id="rId30"/>
+    <p:sldId id="282" r:id="rId31"/>
+    <p:sldId id="262" r:id="rId32"/>
+    <p:sldId id="269" r:id="rId33"/>
+    <p:sldId id="270" r:id="rId34"/>
   </p:sldIdLst>
   <p:sldSz cx="9144000" cy="6858000" type="screen4x3"/>
   <p:notesSz cx="6858000" cy="9144000"/>
@@ -223,7 +224,7 @@
           <a:p>
             <a:fld id="{932844B1-BEF2-0E49-9577-B2FD91F08929}" type="datetimeFigureOut">
               <a:rPr lang="en-US" smtClean="0"/>
-              <a:t>2/16/15</a:t>
+              <a:t>2/17/15</a:t>
             </a:fld>
             <a:endParaRPr lang="en-US"/>
           </a:p>
@@ -721,6 +722,434 @@
 </p:notes>
 </file>
 
+<file path=ppt/notesSlides/notesSlide10.xml><?xml version="1.0" encoding="utf-8"?>
+<p:notes xmlns:a="http://schemas.openxmlformats.org/drawingml/2006/main" xmlns:r="http://schemas.openxmlformats.org/officeDocument/2006/relationships" xmlns:p="http://schemas.openxmlformats.org/presentationml/2006/main">
+  <p:cSld>
+    <p:spTree>
+      <p:nvGrpSpPr>
+        <p:cNvPr id="1" name=""/>
+        <p:cNvGrpSpPr/>
+        <p:nvPr/>
+      </p:nvGrpSpPr>
+      <p:grpSpPr>
+        <a:xfrm>
+          <a:off x="0" y="0"/>
+          <a:ext cx="0" cy="0"/>
+          <a:chOff x="0" y="0"/>
+          <a:chExt cx="0" cy="0"/>
+        </a:xfrm>
+      </p:grpSpPr>
+      <p:sp>
+        <p:nvSpPr>
+          <p:cNvPr id="2" name="Slide Image Placeholder 1"/>
+          <p:cNvSpPr>
+            <a:spLocks noGrp="1" noRot="1" noChangeAspect="1"/>
+          </p:cNvSpPr>
+          <p:nvPr>
+            <p:ph type="sldImg"/>
+          </p:nvPr>
+        </p:nvSpPr>
+        <p:spPr/>
+      </p:sp>
+      <p:sp>
+        <p:nvSpPr>
+          <p:cNvPr id="3" name="Notes Placeholder 2"/>
+          <p:cNvSpPr>
+            <a:spLocks noGrp="1"/>
+          </p:cNvSpPr>
+          <p:nvPr>
+            <p:ph type="body" idx="1"/>
+          </p:nvPr>
+        </p:nvSpPr>
+        <p:spPr/>
+        <p:txBody>
+          <a:bodyPr/>
+          <a:lstStyle/>
+          <a:p>
+            <a:r>
+              <a:rPr lang="en-US" dirty="0" smtClean="0"/>
+              <a:t>Echo</a:t>
+            </a:r>
+            <a:r>
+              <a:rPr lang="en-US" baseline="0" dirty="0" smtClean="0"/>
+              <a:t> Application</a:t>
+            </a:r>
+            <a:endParaRPr lang="en-US" dirty="0"/>
+          </a:p>
+        </p:txBody>
+      </p:sp>
+      <p:sp>
+        <p:nvSpPr>
+          <p:cNvPr id="4" name="Slide Number Placeholder 3"/>
+          <p:cNvSpPr>
+            <a:spLocks noGrp="1"/>
+          </p:cNvSpPr>
+          <p:nvPr>
+            <p:ph type="sldNum" sz="quarter" idx="10"/>
+          </p:nvPr>
+        </p:nvSpPr>
+        <p:spPr/>
+        <p:txBody>
+          <a:bodyPr/>
+          <a:lstStyle/>
+          <a:p>
+            <a:fld id="{DECA9997-28A8-554D-8259-036D0AEFA0A8}" type="slidenum">
+              <a:rPr lang="en-US" smtClean="0"/>
+              <a:t>18</a:t>
+            </a:fld>
+            <a:endParaRPr lang="en-US"/>
+          </a:p>
+        </p:txBody>
+      </p:sp>
+    </p:spTree>
+    <p:extLst>
+      <p:ext uri="{BB962C8B-B14F-4D97-AF65-F5344CB8AC3E}">
+        <p14:creationId xmlns:p14="http://schemas.microsoft.com/office/powerpoint/2010/main" val="3111486229"/>
+      </p:ext>
+    </p:extLst>
+  </p:cSld>
+  <p:clrMapOvr>
+    <a:masterClrMapping/>
+  </p:clrMapOvr>
+</p:notes>
+</file>
+
+<file path=ppt/notesSlides/notesSlide11.xml><?xml version="1.0" encoding="utf-8"?>
+<p:notes xmlns:a="http://schemas.openxmlformats.org/drawingml/2006/main" xmlns:r="http://schemas.openxmlformats.org/officeDocument/2006/relationships" xmlns:p="http://schemas.openxmlformats.org/presentationml/2006/main">
+  <p:cSld>
+    <p:spTree>
+      <p:nvGrpSpPr>
+        <p:cNvPr id="1" name=""/>
+        <p:cNvGrpSpPr/>
+        <p:nvPr/>
+      </p:nvGrpSpPr>
+      <p:grpSpPr>
+        <a:xfrm>
+          <a:off x="0" y="0"/>
+          <a:ext cx="0" cy="0"/>
+          <a:chOff x="0" y="0"/>
+          <a:chExt cx="0" cy="0"/>
+        </a:xfrm>
+      </p:grpSpPr>
+      <p:sp>
+        <p:nvSpPr>
+          <p:cNvPr id="2" name="Slide Image Placeholder 1"/>
+          <p:cNvSpPr>
+            <a:spLocks noGrp="1" noRot="1" noChangeAspect="1"/>
+          </p:cNvSpPr>
+          <p:nvPr>
+            <p:ph type="sldImg"/>
+          </p:nvPr>
+        </p:nvSpPr>
+        <p:spPr/>
+      </p:sp>
+      <p:sp>
+        <p:nvSpPr>
+          <p:cNvPr id="3" name="Notes Placeholder 2"/>
+          <p:cNvSpPr>
+            <a:spLocks noGrp="1"/>
+          </p:cNvSpPr>
+          <p:nvPr>
+            <p:ph type="body" idx="1"/>
+          </p:nvPr>
+        </p:nvSpPr>
+        <p:spPr/>
+        <p:txBody>
+          <a:bodyPr/>
+          <a:lstStyle/>
+          <a:p>
+            <a:r>
+              <a:rPr lang="en-US" dirty="0" smtClean="0"/>
+              <a:t>U</a:t>
+            </a:r>
+            <a:r>
+              <a:rPr lang="en-US" baseline="0" dirty="0" smtClean="0"/>
+              <a:t>nchecked exceptions encourage "happy-path" coding and ignoring important branching logic.</a:t>
+            </a:r>
+          </a:p>
+          <a:p>
+            <a:r>
+              <a:rPr lang="en-US" baseline="0" dirty="0" smtClean="0"/>
+              <a:t>Checked exceptions created exception handling complexity and complexity creates insecurity.</a:t>
+            </a:r>
+            <a:endParaRPr lang="en-US" dirty="0"/>
+          </a:p>
+        </p:txBody>
+      </p:sp>
+      <p:sp>
+        <p:nvSpPr>
+          <p:cNvPr id="4" name="Slide Number Placeholder 3"/>
+          <p:cNvSpPr>
+            <a:spLocks noGrp="1"/>
+          </p:cNvSpPr>
+          <p:nvPr>
+            <p:ph type="sldNum" sz="quarter" idx="10"/>
+          </p:nvPr>
+        </p:nvSpPr>
+        <p:spPr/>
+        <p:txBody>
+          <a:bodyPr/>
+          <a:lstStyle/>
+          <a:p>
+            <a:fld id="{DECA9997-28A8-554D-8259-036D0AEFA0A8}" type="slidenum">
+              <a:rPr lang="en-US" smtClean="0"/>
+              <a:t>20</a:t>
+            </a:fld>
+            <a:endParaRPr lang="en-US"/>
+          </a:p>
+        </p:txBody>
+      </p:sp>
+    </p:spTree>
+    <p:extLst>
+      <p:ext uri="{BB962C8B-B14F-4D97-AF65-F5344CB8AC3E}">
+        <p14:creationId xmlns:p14="http://schemas.microsoft.com/office/powerpoint/2010/main" val="3655653971"/>
+      </p:ext>
+    </p:extLst>
+  </p:cSld>
+  <p:clrMapOvr>
+    <a:masterClrMapping/>
+  </p:clrMapOvr>
+</p:notes>
+</file>
+
+<file path=ppt/notesSlides/notesSlide12.xml><?xml version="1.0" encoding="utf-8"?>
+<p:notes xmlns:a="http://schemas.openxmlformats.org/drawingml/2006/main" xmlns:r="http://schemas.openxmlformats.org/officeDocument/2006/relationships" xmlns:p="http://schemas.openxmlformats.org/presentationml/2006/main">
+  <p:cSld>
+    <p:spTree>
+      <p:nvGrpSpPr>
+        <p:cNvPr id="1" name=""/>
+        <p:cNvGrpSpPr/>
+        <p:nvPr/>
+      </p:nvGrpSpPr>
+      <p:grpSpPr>
+        <a:xfrm>
+          <a:off x="0" y="0"/>
+          <a:ext cx="0" cy="0"/>
+          <a:chOff x="0" y="0"/>
+          <a:chExt cx="0" cy="0"/>
+        </a:xfrm>
+      </p:grpSpPr>
+      <p:sp>
+        <p:nvSpPr>
+          <p:cNvPr id="2" name="Slide Image Placeholder 1"/>
+          <p:cNvSpPr>
+            <a:spLocks noGrp="1" noRot="1" noChangeAspect="1"/>
+          </p:cNvSpPr>
+          <p:nvPr>
+            <p:ph type="sldImg"/>
+          </p:nvPr>
+        </p:nvSpPr>
+        <p:spPr/>
+      </p:sp>
+      <p:sp>
+        <p:nvSpPr>
+          <p:cNvPr id="3" name="Notes Placeholder 2"/>
+          <p:cNvSpPr>
+            <a:spLocks noGrp="1"/>
+          </p:cNvSpPr>
+          <p:nvPr>
+            <p:ph type="body" idx="1"/>
+          </p:nvPr>
+        </p:nvSpPr>
+        <p:spPr/>
+        <p:txBody>
+          <a:bodyPr/>
+          <a:lstStyle/>
+          <a:p>
+            <a:r>
+              <a:rPr lang="en-US" dirty="0" smtClean="0"/>
+              <a:t>"Provable", I realize is a bit of a misnomer,</a:t>
+            </a:r>
+            <a:r>
+              <a:rPr lang="en-US" baseline="0" dirty="0" smtClean="0"/>
+              <a:t> or perhaps we could charitably call it a "north star". Although security is unlikely to be truly provable, we can at least make incremental steps in that directions by being realistic about what is and what is not an exceptional condition.</a:t>
+            </a:r>
+          </a:p>
+          <a:p>
+            <a:endParaRPr lang="en-US" baseline="0" dirty="0" smtClean="0"/>
+          </a:p>
+          <a:p>
+            <a:r>
+              <a:rPr lang="en-US" baseline="0" dirty="0" smtClean="0"/>
+              <a:t>For example:</a:t>
+            </a:r>
+          </a:p>
+          <a:p>
+            <a:pPr marL="171450" indent="-171450">
+              <a:buFontTx/>
+              <a:buChar char="-"/>
+            </a:pPr>
+            <a:r>
+              <a:rPr lang="en-US" baseline="0" dirty="0" smtClean="0"/>
+              <a:t>Is it realistic to say that your single page app is never going to have connection problems?</a:t>
+            </a:r>
+          </a:p>
+          <a:p>
+            <a:pPr marL="171450" indent="-171450">
+              <a:buFontTx/>
+              <a:buChar char="-"/>
+            </a:pPr>
+            <a:r>
+              <a:rPr lang="en-US" baseline="0" dirty="0" smtClean="0"/>
+              <a:t>Is it realistic to say that your database-backed application is always going to be able to reach the database?</a:t>
+            </a:r>
+            <a:endParaRPr lang="en-US" dirty="0" smtClean="0"/>
+          </a:p>
+          <a:p>
+            <a:endParaRPr lang="en-US" dirty="0" smtClean="0"/>
+          </a:p>
+          <a:p>
+            <a:r>
+              <a:rPr lang="en-US" dirty="0" err="1" smtClean="0"/>
+              <a:t>Optionals</a:t>
+            </a:r>
+            <a:r>
+              <a:rPr lang="en-US" baseline="0" dirty="0" smtClean="0"/>
+              <a:t>, and even better Eithers encourage the consuming developer to consider the path.</a:t>
+            </a:r>
+          </a:p>
+          <a:p>
+            <a:r>
+              <a:rPr lang="en-US" baseline="0" dirty="0" smtClean="0"/>
+              <a:t>Other than the most cataclysmic and exceptional conditions, you should not throw exceptions.</a:t>
+            </a:r>
+          </a:p>
+          <a:p>
+            <a:r>
+              <a:rPr lang="en-US" baseline="0" dirty="0" smtClean="0"/>
+              <a:t>Libraries can create a challenge, so there is value in creating a seam between your code and the consuming code and convert exceptions—this can add some complexity but it can be worth the cost.</a:t>
+            </a:r>
+            <a:endParaRPr lang="en-US" dirty="0"/>
+          </a:p>
+        </p:txBody>
+      </p:sp>
+      <p:sp>
+        <p:nvSpPr>
+          <p:cNvPr id="4" name="Slide Number Placeholder 3"/>
+          <p:cNvSpPr>
+            <a:spLocks noGrp="1"/>
+          </p:cNvSpPr>
+          <p:nvPr>
+            <p:ph type="sldNum" sz="quarter" idx="10"/>
+          </p:nvPr>
+        </p:nvSpPr>
+        <p:spPr/>
+        <p:txBody>
+          <a:bodyPr/>
+          <a:lstStyle/>
+          <a:p>
+            <a:fld id="{DECA9997-28A8-554D-8259-036D0AEFA0A8}" type="slidenum">
+              <a:rPr lang="en-US" smtClean="0"/>
+              <a:t>21</a:t>
+            </a:fld>
+            <a:endParaRPr lang="en-US"/>
+          </a:p>
+        </p:txBody>
+      </p:sp>
+    </p:spTree>
+    <p:extLst>
+      <p:ext uri="{BB962C8B-B14F-4D97-AF65-F5344CB8AC3E}">
+        <p14:creationId xmlns:p14="http://schemas.microsoft.com/office/powerpoint/2010/main" val="2164147239"/>
+      </p:ext>
+    </p:extLst>
+  </p:cSld>
+  <p:clrMapOvr>
+    <a:masterClrMapping/>
+  </p:clrMapOvr>
+</p:notes>
+</file>
+
+<file path=ppt/notesSlides/notesSlide13.xml><?xml version="1.0" encoding="utf-8"?>
+<p:notes xmlns:a="http://schemas.openxmlformats.org/drawingml/2006/main" xmlns:r="http://schemas.openxmlformats.org/officeDocument/2006/relationships" xmlns:p="http://schemas.openxmlformats.org/presentationml/2006/main">
+  <p:cSld>
+    <p:spTree>
+      <p:nvGrpSpPr>
+        <p:cNvPr id="1" name=""/>
+        <p:cNvGrpSpPr/>
+        <p:nvPr/>
+      </p:nvGrpSpPr>
+      <p:grpSpPr>
+        <a:xfrm>
+          <a:off x="0" y="0"/>
+          <a:ext cx="0" cy="0"/>
+          <a:chOff x="0" y="0"/>
+          <a:chExt cx="0" cy="0"/>
+        </a:xfrm>
+      </p:grpSpPr>
+      <p:sp>
+        <p:nvSpPr>
+          <p:cNvPr id="2" name="Slide Image Placeholder 1"/>
+          <p:cNvSpPr>
+            <a:spLocks noGrp="1" noRot="1" noChangeAspect="1"/>
+          </p:cNvSpPr>
+          <p:nvPr>
+            <p:ph type="sldImg"/>
+          </p:nvPr>
+        </p:nvSpPr>
+        <p:spPr/>
+      </p:sp>
+      <p:sp>
+        <p:nvSpPr>
+          <p:cNvPr id="3" name="Notes Placeholder 2"/>
+          <p:cNvSpPr>
+            <a:spLocks noGrp="1"/>
+          </p:cNvSpPr>
+          <p:nvPr>
+            <p:ph type="body" idx="1"/>
+          </p:nvPr>
+        </p:nvSpPr>
+        <p:spPr/>
+        <p:txBody>
+          <a:bodyPr/>
+          <a:lstStyle/>
+          <a:p>
+            <a:r>
+              <a:rPr lang="en-US" dirty="0" smtClean="0"/>
+              <a:t>For the love of god, let's find a</a:t>
+            </a:r>
+            <a:r>
+              <a:rPr lang="en-US" baseline="0" dirty="0" smtClean="0"/>
+              <a:t> better name for this. If we only achieve one thing by the end of this presentation, let's have a nice snappy name for the fact that companies have a tendency, if we're lucky, to do some up-front security analysis, maybe a little threat modeling or risk assessment, then do nothing until the product is about to come out the door and throw a bunch of pen testers or tools at the software they have created and force their development team to quick changes a bunch of stuff at the last second. That's not a security strategy, that's a pathology.</a:t>
+            </a:r>
+          </a:p>
+        </p:txBody>
+      </p:sp>
+      <p:sp>
+        <p:nvSpPr>
+          <p:cNvPr id="4" name="Slide Number Placeholder 3"/>
+          <p:cNvSpPr>
+            <a:spLocks noGrp="1"/>
+          </p:cNvSpPr>
+          <p:nvPr>
+            <p:ph type="sldNum" sz="quarter" idx="10"/>
+          </p:nvPr>
+        </p:nvSpPr>
+        <p:spPr/>
+        <p:txBody>
+          <a:bodyPr/>
+          <a:lstStyle/>
+          <a:p>
+            <a:fld id="{DECA9997-28A8-554D-8259-036D0AEFA0A8}" type="slidenum">
+              <a:rPr lang="en-US" smtClean="0"/>
+              <a:t>28</a:t>
+            </a:fld>
+            <a:endParaRPr lang="en-US"/>
+          </a:p>
+        </p:txBody>
+      </p:sp>
+    </p:spTree>
+    <p:extLst>
+      <p:ext uri="{BB962C8B-B14F-4D97-AF65-F5344CB8AC3E}">
+        <p14:creationId xmlns:p14="http://schemas.microsoft.com/office/powerpoint/2010/main" val="1684281639"/>
+      </p:ext>
+    </p:extLst>
+  </p:cSld>
+  <p:clrMapOvr>
+    <a:masterClrMapping/>
+  </p:clrMapOvr>
+</p:notes>
+</file>
+
 <file path=ppt/notesSlides/notesSlide2.xml><?xml version="1.0" encoding="utf-8"?>
 <p:notes xmlns:a="http://schemas.openxmlformats.org/drawingml/2006/main" xmlns:r="http://schemas.openxmlformats.org/officeDocument/2006/relationships" xmlns:p="http://schemas.openxmlformats.org/presentationml/2006/main">
   <p:cSld>
@@ -765,22 +1194,6 @@
           <a:bodyPr/>
           <a:lstStyle/>
           <a:p>
-            <a:r>
-              <a:rPr lang="en-US" dirty="0" smtClean="0"/>
-              <a:t>I expect I don't have to spend TOO</a:t>
-            </a:r>
-            <a:r>
-              <a:rPr lang="en-US" baseline="0" dirty="0" smtClean="0"/>
-              <a:t> much time convincing you of this. The software industry, in collaboration with hackers have already probably don't a pretty good job of that already. But nonetheless, in case some of you are the last hold-out troglodytes who have been living under a rock for so long that the names "Home Depot", "Sony", "Good Will", "PF </a:t>
-            </a:r>
-            <a:r>
-              <a:rPr lang="en-US" baseline="0" dirty="0" err="1" smtClean="0"/>
-              <a:t>Changs</a:t>
-            </a:r>
-            <a:r>
-              <a:rPr lang="en-US" baseline="0" dirty="0" smtClean="0"/>
-              <a:t>" and ""JP Morgan" either don't mean anything to you, or you don't see how their connected.</a:t>
-            </a:r>
             <a:endParaRPr lang="en-US" dirty="0"/>
           </a:p>
         </p:txBody>
@@ -802,7 +1215,7 @@
           <a:p>
             <a:fld id="{DECA9997-28A8-554D-8259-036D0AEFA0A8}" type="slidenum">
               <a:rPr lang="en-US" smtClean="0"/>
-              <a:t>3</a:t>
+              <a:t>2</a:t>
             </a:fld>
             <a:endParaRPr lang="en-US"/>
           </a:p>
@@ -811,7 +1224,7 @@
     </p:spTree>
     <p:extLst>
       <p:ext uri="{BB962C8B-B14F-4D97-AF65-F5344CB8AC3E}">
-        <p14:creationId xmlns:p14="http://schemas.microsoft.com/office/powerpoint/2010/main" val="2446704582"/>
+        <p14:creationId xmlns:p14="http://schemas.microsoft.com/office/powerpoint/2010/main" val="3926768291"/>
       </p:ext>
     </p:extLst>
   </p:cSld>
@@ -867,11 +1280,19 @@
           <a:p>
             <a:r>
               <a:rPr lang="en-US" dirty="0" smtClean="0"/>
-              <a:t>I don't actually wear a tin-foil hat, at</a:t>
+              <a:t>I expect I don't have to spend TOO</a:t>
             </a:r>
             <a:r>
               <a:rPr lang="en-US" baseline="0" dirty="0" smtClean="0"/>
-              <a:t> least not in public, but I'm one of those people. I believe things are going to get very, very ugly over the next couple years. </a:t>
+              <a:t> much time convincing you of this. The software industry, in collaboration with hackers have already probably don't a pretty good job of that already. But nonetheless, in case some of you are the last hold-out troglodytes who have been living under a rock for so long that the names "Home Depot", "Sony", "Good Will", "PF </a:t>
+            </a:r>
+            <a:r>
+              <a:rPr lang="en-US" baseline="0" dirty="0" err="1" smtClean="0"/>
+              <a:t>Changs</a:t>
+            </a:r>
+            <a:r>
+              <a:rPr lang="en-US" baseline="0" dirty="0" smtClean="0"/>
+              <a:t>" and ""JP Morgan" either don't mean anything to you, or you don't see how their connected.</a:t>
             </a:r>
             <a:endParaRPr lang="en-US" dirty="0"/>
           </a:p>
@@ -894,7 +1315,7 @@
           <a:p>
             <a:fld id="{DECA9997-28A8-554D-8259-036D0AEFA0A8}" type="slidenum">
               <a:rPr lang="en-US" smtClean="0"/>
-              <a:t>5</a:t>
+              <a:t>3</a:t>
             </a:fld>
             <a:endParaRPr lang="en-US"/>
           </a:p>
@@ -903,7 +1324,7 @@
     </p:spTree>
     <p:extLst>
       <p:ext uri="{BB962C8B-B14F-4D97-AF65-F5344CB8AC3E}">
-        <p14:creationId xmlns:p14="http://schemas.microsoft.com/office/powerpoint/2010/main" val="1333080865"/>
+        <p14:creationId xmlns:p14="http://schemas.microsoft.com/office/powerpoint/2010/main" val="2446704582"/>
       </p:ext>
     </p:extLst>
   </p:cSld>
@@ -959,11 +1380,11 @@
           <a:p>
             <a:r>
               <a:rPr lang="en-US" dirty="0" smtClean="0"/>
-              <a:t>This is</a:t>
+              <a:t>I don't actually wear a tin-foil hat, at</a:t>
             </a:r>
             <a:r>
               <a:rPr lang="en-US" baseline="0" dirty="0" smtClean="0"/>
-              <a:t> really why you're here. You're hoping for silver bullets. Well, unfortunately, instead you're going to get a few concrete strategies, a few broad suggestions, and a number of obscure ravings from a guy who has an idea of how this stuff could work, but hasn't yet figured out yet how to convince anyone that he's right. </a:t>
+              <a:t> least not in public, but I'm one of those people. I believe things are going to get very, very ugly over the next couple years. </a:t>
             </a:r>
             <a:endParaRPr lang="en-US" dirty="0"/>
           </a:p>
@@ -986,7 +1407,7 @@
           <a:p>
             <a:fld id="{DECA9997-28A8-554D-8259-036D0AEFA0A8}" type="slidenum">
               <a:rPr lang="en-US" smtClean="0"/>
-              <a:t>8</a:t>
+              <a:t>5</a:t>
             </a:fld>
             <a:endParaRPr lang="en-US"/>
           </a:p>
@@ -995,7 +1416,7 @@
     </p:spTree>
     <p:extLst>
       <p:ext uri="{BB962C8B-B14F-4D97-AF65-F5344CB8AC3E}">
-        <p14:creationId xmlns:p14="http://schemas.microsoft.com/office/powerpoint/2010/main" val="2816457136"/>
+        <p14:creationId xmlns:p14="http://schemas.microsoft.com/office/powerpoint/2010/main" val="1333080865"/>
       </p:ext>
     </p:extLst>
   </p:cSld>
@@ -1049,14 +1470,6 @@
           <a:bodyPr/>
           <a:lstStyle/>
           <a:p>
-            <a:r>
-              <a:rPr lang="en-US" dirty="0" smtClean="0"/>
-              <a:t>Echo</a:t>
-            </a:r>
-            <a:r>
-              <a:rPr lang="en-US" baseline="0" dirty="0" smtClean="0"/>
-              <a:t> Application</a:t>
-            </a:r>
             <a:endParaRPr lang="en-US" dirty="0"/>
           </a:p>
         </p:txBody>
@@ -1078,7 +1491,7 @@
           <a:p>
             <a:fld id="{DECA9997-28A8-554D-8259-036D0AEFA0A8}" type="slidenum">
               <a:rPr lang="en-US" smtClean="0"/>
-              <a:t>17</a:t>
+              <a:t>6</a:t>
             </a:fld>
             <a:endParaRPr lang="en-US"/>
           </a:p>
@@ -1087,7 +1500,7 @@
     </p:spTree>
     <p:extLst>
       <p:ext uri="{BB962C8B-B14F-4D97-AF65-F5344CB8AC3E}">
-        <p14:creationId xmlns:p14="http://schemas.microsoft.com/office/powerpoint/2010/main" val="3111486229"/>
+        <p14:creationId xmlns:p14="http://schemas.microsoft.com/office/powerpoint/2010/main" val="1665803678"/>
       </p:ext>
     </p:extLst>
   </p:cSld>
@@ -1143,19 +1556,12 @@
           <a:p>
             <a:r>
               <a:rPr lang="en-US" dirty="0" smtClean="0"/>
-              <a:t>U</a:t>
+              <a:t>Back</a:t>
             </a:r>
             <a:r>
               <a:rPr lang="en-US" baseline="0" dirty="0" smtClean="0"/>
-              <a:t>nchecked exceptions encourage "happy-path" coding and ignoring important branching logic.</a:t>
-            </a:r>
-          </a:p>
-          <a:p>
-            <a:r>
-              <a:rPr lang="en-US" baseline="0" dirty="0" smtClean="0"/>
-              <a:t>Checked exceptions created exception handling complexity and complexity creates insecurity.</a:t>
-            </a:r>
-            <a:endParaRPr lang="en-US" dirty="0"/>
+              <a:t> in the good old pre-Internet days, we had a very similar situations on our hands: If we didn't do array bounds checking in our C code and made assumptions about the lengths of input, attackers had the opportunity to write executable code into program execution space. I'm certainly not willing to say that this is a thing of that past, however, interpreted languages and more sophisticated native runtimes provide some measure of protection from this vulnerability. In short: they create "firewalls" between storage used for executable code and for data.</a:t>
+            </a:r>
           </a:p>
         </p:txBody>
       </p:sp>
@@ -1176,7 +1582,7 @@
           <a:p>
             <a:fld id="{DECA9997-28A8-554D-8259-036D0AEFA0A8}" type="slidenum">
               <a:rPr lang="en-US" smtClean="0"/>
-              <a:t>19</a:t>
+              <a:t>7</a:t>
             </a:fld>
             <a:endParaRPr lang="en-US"/>
           </a:p>
@@ -1185,7 +1591,7 @@
     </p:spTree>
     <p:extLst>
       <p:ext uri="{BB962C8B-B14F-4D97-AF65-F5344CB8AC3E}">
-        <p14:creationId xmlns:p14="http://schemas.microsoft.com/office/powerpoint/2010/main" val="3655653971"/>
+        <p14:creationId xmlns:p14="http://schemas.microsoft.com/office/powerpoint/2010/main" val="1991878916"/>
       </p:ext>
     </p:extLst>
   </p:cSld>
@@ -1240,28 +1646,12 @@
           <a:lstStyle/>
           <a:p>
             <a:r>
-              <a:rPr lang="en-US" dirty="0" err="1" smtClean="0"/>
-              <a:t>Optionals</a:t>
+              <a:rPr lang="en-US" dirty="0" smtClean="0"/>
+              <a:t>What</a:t>
             </a:r>
             <a:r>
               <a:rPr lang="en-US" baseline="0" dirty="0" smtClean="0"/>
-              <a:t>, and even better Eithers encourage the consuming developer to consider the path.</a:t>
-            </a:r>
-          </a:p>
-          <a:p>
-            <a:r>
-              <a:rPr lang="en-US" baseline="0" dirty="0" smtClean="0"/>
-              <a:t>Other than the most cataclysmic and exceptional conditions, you should not throw exceptions.</a:t>
-            </a:r>
-          </a:p>
-          <a:p>
-            <a:r>
-              <a:rPr lang="en-US" baseline="0" dirty="0" smtClean="0"/>
-              <a:t>Libraries can create a challenge, so there is value in creating a seam between your code and the consuming code and convert exceptions—this can add some complexity but it can be worth </a:t>
-            </a:r>
-            <a:r>
-              <a:rPr lang="en-US" baseline="0" smtClean="0"/>
-              <a:t>the cost.</a:t>
+              <a:t> do we see here?</a:t>
             </a:r>
             <a:endParaRPr lang="en-US" dirty="0"/>
           </a:p>
@@ -1284,7 +1674,7 @@
           <a:p>
             <a:fld id="{DECA9997-28A8-554D-8259-036D0AEFA0A8}" type="slidenum">
               <a:rPr lang="en-US" smtClean="0"/>
-              <a:t>20</a:t>
+              <a:t>8</a:t>
             </a:fld>
             <a:endParaRPr lang="en-US"/>
           </a:p>
@@ -1293,7 +1683,7 @@
     </p:spTree>
     <p:extLst>
       <p:ext uri="{BB962C8B-B14F-4D97-AF65-F5344CB8AC3E}">
-        <p14:creationId xmlns:p14="http://schemas.microsoft.com/office/powerpoint/2010/main" val="2164147239"/>
+        <p14:creationId xmlns:p14="http://schemas.microsoft.com/office/powerpoint/2010/main" val="879852660"/>
       </p:ext>
     </p:extLst>
   </p:cSld>
@@ -1349,12 +1739,13 @@
           <a:p>
             <a:r>
               <a:rPr lang="en-US" dirty="0" smtClean="0"/>
-              <a:t>For the love of god, let's find a</a:t>
+              <a:t>This is</a:t>
             </a:r>
             <a:r>
               <a:rPr lang="en-US" baseline="0" dirty="0" smtClean="0"/>
-              <a:t> better name for this. If we only achieve one thing by the end of this presentation, let's have a nice snappy name for the fact that companies have a tendency, if we're lucky, to do some up-front security analysis, maybe a little threat modeling or risk assessment, then do nothing until the product is about to come out the door and throw a bunch of pen testers or tools at the software they have created and force their development team to quick changes a bunch of stuff at the last second. That's not a security strategy, that's a pathology.</a:t>
-            </a:r>
+              <a:t> really why you're here. You're hoping for silver bullets. Well, unfortunately, instead you're going to get a few concrete strategies, a few broad suggestions, and a number of obscure ravings from a guy who has an idea of how this stuff could work, but hasn't yet figured out yet how to convince anyone that he's right. </a:t>
+            </a:r>
+            <a:endParaRPr lang="en-US" dirty="0"/>
           </a:p>
         </p:txBody>
       </p:sp>
@@ -1375,7 +1766,7 @@
           <a:p>
             <a:fld id="{DECA9997-28A8-554D-8259-036D0AEFA0A8}" type="slidenum">
               <a:rPr lang="en-US" smtClean="0"/>
-              <a:t>27</a:t>
+              <a:t>9</a:t>
             </a:fld>
             <a:endParaRPr lang="en-US"/>
           </a:p>
@@ -1384,7 +1775,162 @@
     </p:spTree>
     <p:extLst>
       <p:ext uri="{BB962C8B-B14F-4D97-AF65-F5344CB8AC3E}">
-        <p14:creationId xmlns:p14="http://schemas.microsoft.com/office/powerpoint/2010/main" val="1684281639"/>
+        <p14:creationId xmlns:p14="http://schemas.microsoft.com/office/powerpoint/2010/main" val="2816457136"/>
+      </p:ext>
+    </p:extLst>
+  </p:cSld>
+  <p:clrMapOvr>
+    <a:masterClrMapping/>
+  </p:clrMapOvr>
+</p:notes>
+</file>
+
+<file path=ppt/notesSlides/notesSlide9.xml><?xml version="1.0" encoding="utf-8"?>
+<p:notes xmlns:a="http://schemas.openxmlformats.org/drawingml/2006/main" xmlns:r="http://schemas.openxmlformats.org/officeDocument/2006/relationships" xmlns:p="http://schemas.openxmlformats.org/presentationml/2006/main">
+  <p:cSld>
+    <p:spTree>
+      <p:nvGrpSpPr>
+        <p:cNvPr id="1" name=""/>
+        <p:cNvGrpSpPr/>
+        <p:nvPr/>
+      </p:nvGrpSpPr>
+      <p:grpSpPr>
+        <a:xfrm>
+          <a:off x="0" y="0"/>
+          <a:ext cx="0" cy="0"/>
+          <a:chOff x="0" y="0"/>
+          <a:chExt cx="0" cy="0"/>
+        </a:xfrm>
+      </p:grpSpPr>
+      <p:sp>
+        <p:nvSpPr>
+          <p:cNvPr id="2" name="Slide Image Placeholder 1"/>
+          <p:cNvSpPr>
+            <a:spLocks noGrp="1" noRot="1" noChangeAspect="1"/>
+          </p:cNvSpPr>
+          <p:nvPr>
+            <p:ph type="sldImg"/>
+          </p:nvPr>
+        </p:nvSpPr>
+        <p:spPr/>
+      </p:sp>
+      <p:sp>
+        <p:nvSpPr>
+          <p:cNvPr id="3" name="Notes Placeholder 2"/>
+          <p:cNvSpPr>
+            <a:spLocks noGrp="1"/>
+          </p:cNvSpPr>
+          <p:nvPr>
+            <p:ph type="body" idx="1"/>
+          </p:nvPr>
+        </p:nvSpPr>
+        <p:spPr/>
+        <p:txBody>
+          <a:bodyPr/>
+          <a:lstStyle/>
+          <a:p>
+            <a:r>
+              <a:rPr lang="en-US" dirty="0" smtClean="0"/>
+              <a:t>Here's another one for the list</a:t>
+            </a:r>
+            <a:r>
+              <a:rPr lang="en-US" baseline="0" dirty="0" smtClean="0"/>
+              <a:t> of things that desperately need a better need. My criteria for selection are:</a:t>
+            </a:r>
+          </a:p>
+          <a:p>
+            <a:pPr marL="171450" indent="-171450">
+              <a:buFontTx/>
+              <a:buChar char="-"/>
+            </a:pPr>
+            <a:r>
+              <a:rPr lang="en-US" baseline="0" dirty="0" smtClean="0"/>
+              <a:t>It clearly articulates the idea of keeping context separate</a:t>
+            </a:r>
+          </a:p>
+          <a:p>
+            <a:pPr marL="171450" indent="-171450">
+              <a:buFontTx/>
+              <a:buChar char="-"/>
+            </a:pPr>
+            <a:r>
+              <a:rPr lang="en-US" baseline="0" dirty="0" smtClean="0"/>
+              <a:t>It's memorable</a:t>
+            </a:r>
+          </a:p>
+          <a:p>
+            <a:pPr marL="0" indent="0">
+              <a:buFontTx/>
+              <a:buNone/>
+            </a:pPr>
+            <a:endParaRPr lang="en-US" baseline="0" dirty="0" smtClean="0"/>
+          </a:p>
+          <a:p>
+            <a:pPr marL="0" indent="0">
+              <a:buFontTx/>
+              <a:buNone/>
+            </a:pPr>
+            <a:r>
+              <a:rPr lang="en-US" baseline="0" dirty="0" smtClean="0"/>
+              <a:t>I think I have those, but it would be nice to have the following two attributes as well:</a:t>
+            </a:r>
+          </a:p>
+          <a:p>
+            <a:pPr marL="171450" indent="-171450">
+              <a:buFontTx/>
+              <a:buChar char="-"/>
+            </a:pPr>
+            <a:r>
+              <a:rPr lang="en-US" baseline="0" dirty="0" smtClean="0"/>
+              <a:t>it's not likely to get me sued by a large corporate entity</a:t>
+            </a:r>
+          </a:p>
+          <a:p>
+            <a:pPr marL="171450" indent="-171450">
+              <a:buFontTx/>
+              <a:buChar char="-"/>
+            </a:pPr>
+            <a:r>
+              <a:rPr lang="en-US" baseline="0" dirty="0" smtClean="0"/>
+              <a:t>It makes sense to people who are younger than 30</a:t>
+            </a:r>
+          </a:p>
+          <a:p>
+            <a:pPr marL="171450" indent="-171450">
+              <a:buFontTx/>
+              <a:buChar char="-"/>
+            </a:pPr>
+            <a:endParaRPr lang="en-US" dirty="0"/>
+          </a:p>
+        </p:txBody>
+      </p:sp>
+      <p:sp>
+        <p:nvSpPr>
+          <p:cNvPr id="4" name="Slide Number Placeholder 3"/>
+          <p:cNvSpPr>
+            <a:spLocks noGrp="1"/>
+          </p:cNvSpPr>
+          <p:nvPr>
+            <p:ph type="sldNum" sz="quarter" idx="10"/>
+          </p:nvPr>
+        </p:nvSpPr>
+        <p:spPr/>
+        <p:txBody>
+          <a:bodyPr/>
+          <a:lstStyle/>
+          <a:p>
+            <a:fld id="{DECA9997-28A8-554D-8259-036D0AEFA0A8}" type="slidenum">
+              <a:rPr lang="en-US" smtClean="0"/>
+              <a:t>15</a:t>
+            </a:fld>
+            <a:endParaRPr lang="en-US"/>
+          </a:p>
+        </p:txBody>
+      </p:sp>
+    </p:spTree>
+    <p:extLst>
+      <p:ext uri="{BB962C8B-B14F-4D97-AF65-F5344CB8AC3E}">
+        <p14:creationId xmlns:p14="http://schemas.microsoft.com/office/powerpoint/2010/main" val="2656378475"/>
       </p:ext>
     </p:extLst>
   </p:cSld>
@@ -1575,7 +2121,7 @@
           <a:p>
             <a:fld id="{FD8F7154-0EB5-9545-974C-3EF0760E2B30}" type="datetimeFigureOut">
               <a:rPr lang="en-US" smtClean="0"/>
-              <a:t>2/16/15</a:t>
+              <a:t>2/17/15</a:t>
             </a:fld>
             <a:endParaRPr lang="en-US"/>
           </a:p>
@@ -1745,7 +2291,7 @@
           <a:p>
             <a:fld id="{FD8F7154-0EB5-9545-974C-3EF0760E2B30}" type="datetimeFigureOut">
               <a:rPr lang="en-US" smtClean="0"/>
-              <a:t>2/16/15</a:t>
+              <a:t>2/17/15</a:t>
             </a:fld>
             <a:endParaRPr lang="en-US"/>
           </a:p>
@@ -1925,7 +2471,7 @@
           <a:p>
             <a:fld id="{FD8F7154-0EB5-9545-974C-3EF0760E2B30}" type="datetimeFigureOut">
               <a:rPr lang="en-US" smtClean="0"/>
-              <a:t>2/16/15</a:t>
+              <a:t>2/17/15</a:t>
             </a:fld>
             <a:endParaRPr lang="en-US"/>
           </a:p>
@@ -2095,7 +2641,7 @@
           <a:p>
             <a:fld id="{FD8F7154-0EB5-9545-974C-3EF0760E2B30}" type="datetimeFigureOut">
               <a:rPr lang="en-US" smtClean="0"/>
-              <a:t>2/16/15</a:t>
+              <a:t>2/17/15</a:t>
             </a:fld>
             <a:endParaRPr lang="en-US"/>
           </a:p>
@@ -2341,7 +2887,7 @@
           <a:p>
             <a:fld id="{FD8F7154-0EB5-9545-974C-3EF0760E2B30}" type="datetimeFigureOut">
               <a:rPr lang="en-US" smtClean="0"/>
-              <a:t>2/16/15</a:t>
+              <a:t>2/17/15</a:t>
             </a:fld>
             <a:endParaRPr lang="en-US"/>
           </a:p>
@@ -2629,7 +3175,7 @@
           <a:p>
             <a:fld id="{FD8F7154-0EB5-9545-974C-3EF0760E2B30}" type="datetimeFigureOut">
               <a:rPr lang="en-US" smtClean="0"/>
-              <a:t>2/16/15</a:t>
+              <a:t>2/17/15</a:t>
             </a:fld>
             <a:endParaRPr lang="en-US"/>
           </a:p>
@@ -3051,7 +3597,7 @@
           <a:p>
             <a:fld id="{FD8F7154-0EB5-9545-974C-3EF0760E2B30}" type="datetimeFigureOut">
               <a:rPr lang="en-US" smtClean="0"/>
-              <a:t>2/16/15</a:t>
+              <a:t>2/17/15</a:t>
             </a:fld>
             <a:endParaRPr lang="en-US"/>
           </a:p>
@@ -3169,7 +3715,7 @@
           <a:p>
             <a:fld id="{FD8F7154-0EB5-9545-974C-3EF0760E2B30}" type="datetimeFigureOut">
               <a:rPr lang="en-US" smtClean="0"/>
-              <a:t>2/16/15</a:t>
+              <a:t>2/17/15</a:t>
             </a:fld>
             <a:endParaRPr lang="en-US"/>
           </a:p>
@@ -3264,7 +3810,7 @@
           <a:p>
             <a:fld id="{FD8F7154-0EB5-9545-974C-3EF0760E2B30}" type="datetimeFigureOut">
               <a:rPr lang="en-US" smtClean="0"/>
-              <a:t>2/16/15</a:t>
+              <a:t>2/17/15</a:t>
             </a:fld>
             <a:endParaRPr lang="en-US"/>
           </a:p>
@@ -3541,7 +4087,7 @@
           <a:p>
             <a:fld id="{FD8F7154-0EB5-9545-974C-3EF0760E2B30}" type="datetimeFigureOut">
               <a:rPr lang="en-US" smtClean="0"/>
-              <a:t>2/16/15</a:t>
+              <a:t>2/17/15</a:t>
             </a:fld>
             <a:endParaRPr lang="en-US"/>
           </a:p>
@@ -3794,7 +4340,7 @@
           <a:p>
             <a:fld id="{FD8F7154-0EB5-9545-974C-3EF0760E2B30}" type="datetimeFigureOut">
               <a:rPr lang="en-US" smtClean="0"/>
-              <a:t>2/16/15</a:t>
+              <a:t>2/17/15</a:t>
             </a:fld>
             <a:endParaRPr lang="en-US"/>
           </a:p>
@@ -4007,7 +4553,7 @@
           <a:p>
             <a:fld id="{FD8F7154-0EB5-9545-974C-3EF0760E2B30}" type="datetimeFigureOut">
               <a:rPr lang="en-US" smtClean="0"/>
-              <a:t>2/16/15</a:t>
+              <a:t>2/17/15</a:t>
             </a:fld>
             <a:endParaRPr lang="en-US"/>
           </a:p>
@@ -4466,12 +5012,18 @@
         </p:nvSpPr>
         <p:spPr/>
         <p:txBody>
-          <a:bodyPr/>
-          <a:lstStyle/>
-          <a:p>
+          <a:bodyPr>
+            <a:normAutofit fontScale="90000"/>
+          </a:bodyPr>
+          <a:lstStyle/>
+          <a:p>
+            <a:r>
+              <a:rPr lang="en-US" dirty="0" smtClean="0"/>
+              <a:t>--- Section 1:</a:t>
+            </a:r>
             <a:r>
               <a:rPr lang="en-US" baseline="0" dirty="0" smtClean="0"/>
-              <a:t>Patterns in Code (Architecture)</a:t>
+              <a:t> Development Patterns ---</a:t>
             </a:r>
             <a:endParaRPr lang="en-US" dirty="0"/>
           </a:p>
@@ -4499,7 +5051,7 @@
     </p:spTree>
     <p:extLst>
       <p:ext uri="{BB962C8B-B14F-4D97-AF65-F5344CB8AC3E}">
-        <p14:creationId xmlns:p14="http://schemas.microsoft.com/office/powerpoint/2010/main" val="3701312247"/>
+        <p14:creationId xmlns:p14="http://schemas.microsoft.com/office/powerpoint/2010/main" val="1570912143"/>
       </p:ext>
     </p:extLst>
   </p:cSld>
@@ -4542,12 +5094,8 @@
           <a:lstStyle/>
           <a:p>
             <a:r>
-              <a:rPr lang="en-US" dirty="0" smtClean="0"/>
-              <a:t>Anti Pattern:</a:t>
-            </a:r>
-            <a:r>
               <a:rPr lang="en-US" baseline="0" dirty="0" smtClean="0"/>
-              <a:t> Mixed Context</a:t>
+              <a:t>Patterns in Code (Architecture)</a:t>
             </a:r>
             <a:endParaRPr lang="en-US" dirty="0"/>
           </a:p>
@@ -4568,14 +5116,14 @@
           <a:bodyPr/>
           <a:lstStyle/>
           <a:p>
-            <a:endParaRPr lang="en-US" dirty="0"/>
+            <a:endParaRPr lang="en-US"/>
           </a:p>
         </p:txBody>
       </p:sp>
     </p:spTree>
     <p:extLst>
       <p:ext uri="{BB962C8B-B14F-4D97-AF65-F5344CB8AC3E}">
-        <p14:creationId xmlns:p14="http://schemas.microsoft.com/office/powerpoint/2010/main" val="3070801986"/>
+        <p14:creationId xmlns:p14="http://schemas.microsoft.com/office/powerpoint/2010/main" val="3701312247"/>
       </p:ext>
     </p:extLst>
   </p:cSld>
@@ -4619,15 +5167,11 @@
           <a:p>
             <a:r>
               <a:rPr lang="en-US" dirty="0" smtClean="0"/>
-              <a:t>Does</a:t>
+              <a:t>Anti Pattern:</a:t>
             </a:r>
             <a:r>
               <a:rPr lang="en-US" baseline="0" dirty="0" smtClean="0"/>
-              <a:t> it </a:t>
-            </a:r>
-            <a:r>
-              <a:rPr lang="en-US" baseline="0" dirty="0" smtClean="0"/>
-              <a:t>Work?</a:t>
+              <a:t> Mixed Context</a:t>
             </a:r>
             <a:endParaRPr lang="en-US" dirty="0"/>
           </a:p>
@@ -4648,20 +5192,14 @@
           <a:bodyPr/>
           <a:lstStyle/>
           <a:p>
-            <a:pPr marL="0" indent="0">
-              <a:buNone/>
-            </a:pPr>
-            <a:r>
-              <a:rPr lang="en-US" dirty="0" smtClean="0"/>
-              <a:t>Yes!</a:t>
-            </a:r>
+            <a:endParaRPr lang="en-US" dirty="0"/>
           </a:p>
         </p:txBody>
       </p:sp>
     </p:spTree>
     <p:extLst>
       <p:ext uri="{BB962C8B-B14F-4D97-AF65-F5344CB8AC3E}">
-        <p14:creationId xmlns:p14="http://schemas.microsoft.com/office/powerpoint/2010/main" val="2442150392"/>
+        <p14:creationId xmlns:p14="http://schemas.microsoft.com/office/powerpoint/2010/main" val="3070801986"/>
       </p:ext>
     </p:extLst>
   </p:cSld>
@@ -4705,50 +5243,45 @@
           <a:p>
             <a:r>
               <a:rPr lang="en-US" dirty="0" smtClean="0"/>
-              <a:t>Is it </a:t>
-            </a:r>
+              <a:t>Does</a:t>
+            </a:r>
+            <a:r>
+              <a:rPr lang="en-US" baseline="0" dirty="0" smtClean="0"/>
+              <a:t> it Work?</a:t>
+            </a:r>
+            <a:endParaRPr lang="en-US" dirty="0"/>
+          </a:p>
+        </p:txBody>
+      </p:sp>
+      <p:sp>
+        <p:nvSpPr>
+          <p:cNvPr id="3" name="Content Placeholder 2"/>
+          <p:cNvSpPr>
+            <a:spLocks noGrp="1"/>
+          </p:cNvSpPr>
+          <p:nvPr>
+            <p:ph idx="1"/>
+          </p:nvPr>
+        </p:nvSpPr>
+        <p:spPr/>
+        <p:txBody>
+          <a:bodyPr/>
+          <a:lstStyle/>
+          <a:p>
+            <a:pPr marL="0" indent="0">
+              <a:buNone/>
+            </a:pPr>
             <a:r>
               <a:rPr lang="en-US" dirty="0" smtClean="0"/>
-              <a:t>Secure</a:t>
-            </a:r>
-            <a:r>
-              <a:rPr lang="en-US" dirty="0" smtClean="0"/>
-              <a:t>?</a:t>
-            </a:r>
-            <a:endParaRPr lang="en-US" dirty="0"/>
-          </a:p>
-        </p:txBody>
-      </p:sp>
-      <p:sp>
-        <p:nvSpPr>
-          <p:cNvPr id="3" name="Content Placeholder 2"/>
-          <p:cNvSpPr>
-            <a:spLocks noGrp="1"/>
-          </p:cNvSpPr>
-          <p:nvPr>
-            <p:ph idx="1"/>
-          </p:nvPr>
-        </p:nvSpPr>
-        <p:spPr/>
-        <p:txBody>
-          <a:bodyPr/>
-          <a:lstStyle/>
-          <a:p>
-            <a:pPr marL="0" indent="0">
-              <a:buNone/>
-            </a:pPr>
-            <a:r>
-              <a:rPr lang="en-US" dirty="0" smtClean="0"/>
-              <a:t>Well… </a:t>
-            </a:r>
-            <a:endParaRPr lang="en-US" dirty="0"/>
+              <a:t>Yes!</a:t>
+            </a:r>
           </a:p>
         </p:txBody>
       </p:sp>
     </p:spTree>
     <p:extLst>
       <p:ext uri="{BB962C8B-B14F-4D97-AF65-F5344CB8AC3E}">
-        <p14:creationId xmlns:p14="http://schemas.microsoft.com/office/powerpoint/2010/main" val="2459304027"/>
+        <p14:creationId xmlns:p14="http://schemas.microsoft.com/office/powerpoint/2010/main" val="2442150392"/>
       </p:ext>
     </p:extLst>
   </p:cSld>
@@ -4792,7 +5325,7 @@
           <a:p>
             <a:r>
               <a:rPr lang="en-US" dirty="0" smtClean="0"/>
-              <a:t>Pattern: MCDLT Pattern</a:t>
+              <a:t>Is it Secure?</a:t>
             </a:r>
             <a:endParaRPr lang="en-US" dirty="0"/>
           </a:p>
@@ -4813,14 +5346,21 @@
           <a:bodyPr/>
           <a:lstStyle/>
           <a:p>
-            <a:endParaRPr lang="en-US"/>
+            <a:pPr marL="0" indent="0">
+              <a:buNone/>
+            </a:pPr>
+            <a:r>
+              <a:rPr lang="en-US" dirty="0" smtClean="0"/>
+              <a:t>Well… </a:t>
+            </a:r>
+            <a:endParaRPr lang="en-US" dirty="0"/>
           </a:p>
         </p:txBody>
       </p:sp>
     </p:spTree>
     <p:extLst>
       <p:ext uri="{BB962C8B-B14F-4D97-AF65-F5344CB8AC3E}">
-        <p14:creationId xmlns:p14="http://schemas.microsoft.com/office/powerpoint/2010/main" val="1068404250"/>
+        <p14:creationId xmlns:p14="http://schemas.microsoft.com/office/powerpoint/2010/main" val="2459304027"/>
       </p:ext>
     </p:extLst>
   </p:cSld>
@@ -4864,15 +5404,19 @@
           <a:p>
             <a:r>
               <a:rPr lang="en-US" dirty="0" smtClean="0"/>
-              <a:t>Does</a:t>
-            </a:r>
-            <a:r>
-              <a:rPr lang="en-US" baseline="0" dirty="0" smtClean="0"/>
-              <a:t> it </a:t>
-            </a:r>
-            <a:r>
-              <a:rPr lang="en-US" baseline="0" dirty="0" smtClean="0"/>
-              <a:t>Work?</a:t>
+              <a:t>Pattern: </a:t>
+            </a:r>
+            <a:r>
+              <a:rPr lang="en-US" dirty="0" err="1" smtClean="0"/>
+              <a:t>McDLT</a:t>
+            </a:r>
+            <a:r>
+              <a:rPr lang="en-US" dirty="0" smtClean="0"/>
+              <a:t> </a:t>
+            </a:r>
+            <a:r>
+              <a:rPr lang="en-US" dirty="0" smtClean="0"/>
+              <a:t>Pattern</a:t>
             </a:r>
             <a:endParaRPr lang="en-US" dirty="0"/>
           </a:p>
@@ -4893,20 +5437,14 @@
           <a:bodyPr/>
           <a:lstStyle/>
           <a:p>
-            <a:pPr marL="0" indent="0">
-              <a:buNone/>
-            </a:pPr>
-            <a:r>
-              <a:rPr lang="en-US" dirty="0" smtClean="0"/>
-              <a:t>Yes!</a:t>
-            </a:r>
+            <a:endParaRPr lang="en-US"/>
           </a:p>
         </p:txBody>
       </p:sp>
     </p:spTree>
     <p:extLst>
       <p:ext uri="{BB962C8B-B14F-4D97-AF65-F5344CB8AC3E}">
-        <p14:creationId xmlns:p14="http://schemas.microsoft.com/office/powerpoint/2010/main" val="3459138038"/>
+        <p14:creationId xmlns:p14="http://schemas.microsoft.com/office/powerpoint/2010/main" val="1068404250"/>
       </p:ext>
     </p:extLst>
   </p:cSld>
@@ -4950,46 +5488,45 @@
           <a:p>
             <a:r>
               <a:rPr lang="en-US" dirty="0" smtClean="0"/>
-              <a:t>Is it </a:t>
-            </a:r>
+              <a:t>Does</a:t>
+            </a:r>
+            <a:r>
+              <a:rPr lang="en-US" baseline="0" dirty="0" smtClean="0"/>
+              <a:t> it Work?</a:t>
+            </a:r>
+            <a:endParaRPr lang="en-US" dirty="0"/>
+          </a:p>
+        </p:txBody>
+      </p:sp>
+      <p:sp>
+        <p:nvSpPr>
+          <p:cNvPr id="3" name="Content Placeholder 2"/>
+          <p:cNvSpPr>
+            <a:spLocks noGrp="1"/>
+          </p:cNvSpPr>
+          <p:nvPr>
+            <p:ph idx="1"/>
+          </p:nvPr>
+        </p:nvSpPr>
+        <p:spPr/>
+        <p:txBody>
+          <a:bodyPr/>
+          <a:lstStyle/>
+          <a:p>
+            <a:pPr marL="0" indent="0">
+              <a:buNone/>
+            </a:pPr>
             <a:r>
               <a:rPr lang="en-US" dirty="0" smtClean="0"/>
-              <a:t>Secure</a:t>
-            </a:r>
-            <a:r>
-              <a:rPr lang="en-US" dirty="0" smtClean="0"/>
-              <a:t>?</a:t>
-            </a:r>
-            <a:endParaRPr lang="en-US" dirty="0"/>
-          </a:p>
-        </p:txBody>
-      </p:sp>
-      <p:sp>
-        <p:nvSpPr>
-          <p:cNvPr id="3" name="Content Placeholder 2"/>
-          <p:cNvSpPr>
-            <a:spLocks noGrp="1"/>
-          </p:cNvSpPr>
-          <p:nvPr>
-            <p:ph idx="1"/>
-          </p:nvPr>
-        </p:nvSpPr>
-        <p:spPr/>
-        <p:txBody>
-          <a:bodyPr/>
-          <a:lstStyle/>
-          <a:p>
-            <a:pPr marL="0" indent="0">
-              <a:buNone/>
-            </a:pPr>
-            <a:endParaRPr lang="en-US" dirty="0"/>
+              <a:t>Yes!</a:t>
+            </a:r>
           </a:p>
         </p:txBody>
       </p:sp>
     </p:spTree>
     <p:extLst>
       <p:ext uri="{BB962C8B-B14F-4D97-AF65-F5344CB8AC3E}">
-        <p14:creationId xmlns:p14="http://schemas.microsoft.com/office/powerpoint/2010/main" val="1869191853"/>
+        <p14:creationId xmlns:p14="http://schemas.microsoft.com/office/powerpoint/2010/main" val="3459138038"/>
       </p:ext>
     </p:extLst>
   </p:cSld>
@@ -5028,18 +5565,12 @@
         </p:nvSpPr>
         <p:spPr/>
         <p:txBody>
-          <a:bodyPr>
-            <a:normAutofit fontScale="90000"/>
-          </a:bodyPr>
+          <a:bodyPr/>
           <a:lstStyle/>
           <a:p>
             <a:r>
               <a:rPr lang="en-US" dirty="0" smtClean="0"/>
-              <a:t>Example Application: </a:t>
-            </a:r>
-            <a:r>
-              <a:rPr lang="en-US" dirty="0" smtClean="0"/>
-              <a:t>Phonebook Context Hell Version</a:t>
+              <a:t>Is it Secure?</a:t>
             </a:r>
             <a:endParaRPr lang="en-US" dirty="0"/>
           </a:p>
@@ -5063,14 +5594,14 @@
             <a:pPr marL="0" indent="0">
               <a:buNone/>
             </a:pPr>
-            <a:endParaRPr lang="en-US" dirty="0" smtClean="0"/>
+            <a:endParaRPr lang="en-US" dirty="0"/>
           </a:p>
         </p:txBody>
       </p:sp>
     </p:spTree>
     <p:extLst>
       <p:ext uri="{BB962C8B-B14F-4D97-AF65-F5344CB8AC3E}">
-        <p14:creationId xmlns:p14="http://schemas.microsoft.com/office/powerpoint/2010/main" val="4019317055"/>
+        <p14:creationId xmlns:p14="http://schemas.microsoft.com/office/powerpoint/2010/main" val="1869191853"/>
       </p:ext>
     </p:extLst>
   </p:cSld>
@@ -5116,19 +5647,7 @@
           <a:p>
             <a:r>
               <a:rPr lang="en-US" dirty="0" smtClean="0"/>
-              <a:t>Example Application:</a:t>
-            </a:r>
-            <a:r>
-              <a:rPr lang="en-US" baseline="0" dirty="0" smtClean="0"/>
-              <a:t> </a:t>
-            </a:r>
-            <a:r>
-              <a:rPr lang="en-US" baseline="0" dirty="0" smtClean="0"/>
-              <a:t>Phone with Context </a:t>
-            </a:r>
-            <a:r>
-              <a:rPr lang="en-US" baseline="0" dirty="0" smtClean="0"/>
-              <a:t>Seams</a:t>
+              <a:t>Example Application: Phonebook Context Hell Version</a:t>
             </a:r>
             <a:endParaRPr lang="en-US" dirty="0"/>
           </a:p>
@@ -5152,14 +5671,14 @@
             <a:pPr marL="0" indent="0">
               <a:buNone/>
             </a:pPr>
-            <a:endParaRPr lang="en-US" dirty="0"/>
+            <a:endParaRPr lang="en-US" dirty="0" smtClean="0"/>
           </a:p>
         </p:txBody>
       </p:sp>
     </p:spTree>
     <p:extLst>
       <p:ext uri="{BB962C8B-B14F-4D97-AF65-F5344CB8AC3E}">
-        <p14:creationId xmlns:p14="http://schemas.microsoft.com/office/powerpoint/2010/main" val="655443441"/>
+        <p14:creationId xmlns:p14="http://schemas.microsoft.com/office/powerpoint/2010/main" val="4019317055"/>
       </p:ext>
     </p:extLst>
   </p:cSld>
@@ -5198,16 +5717,18 @@
         </p:nvSpPr>
         <p:spPr/>
         <p:txBody>
-          <a:bodyPr/>
+          <a:bodyPr>
+            <a:normAutofit fontScale="90000"/>
+          </a:bodyPr>
           <a:lstStyle/>
           <a:p>
             <a:r>
               <a:rPr lang="en-US" dirty="0" smtClean="0"/>
-              <a:t>Anti Pattern:</a:t>
+              <a:t>Example Application:</a:t>
             </a:r>
             <a:r>
               <a:rPr lang="en-US" baseline="0" dirty="0" smtClean="0"/>
-              <a:t> Breaking the Stack</a:t>
+              <a:t> Phone with Context Seams</a:t>
             </a:r>
             <a:endParaRPr lang="en-US" dirty="0"/>
           </a:p>
@@ -5228,6 +5749,9 @@
           <a:bodyPr/>
           <a:lstStyle/>
           <a:p>
+            <a:pPr marL="0" indent="0">
+              <a:buNone/>
+            </a:pPr>
             <a:endParaRPr lang="en-US" dirty="0"/>
           </a:p>
         </p:txBody>
@@ -5235,7 +5759,7 @@
     </p:spTree>
     <p:extLst>
       <p:ext uri="{BB962C8B-B14F-4D97-AF65-F5344CB8AC3E}">
-        <p14:creationId xmlns:p14="http://schemas.microsoft.com/office/powerpoint/2010/main" val="933988275"/>
+        <p14:creationId xmlns:p14="http://schemas.microsoft.com/office/powerpoint/2010/main" val="655443441"/>
       </p:ext>
     </p:extLst>
   </p:cSld>
@@ -5351,11 +5875,11 @@
           <a:p>
             <a:r>
               <a:rPr lang="en-US" dirty="0" smtClean="0"/>
-              <a:t>Pattern: "Provable"</a:t>
+              <a:t>Anti Pattern:</a:t>
             </a:r>
             <a:r>
               <a:rPr lang="en-US" baseline="0" dirty="0" smtClean="0"/>
-              <a:t> Security</a:t>
+              <a:t> Breaking the Stack</a:t>
             </a:r>
             <a:endParaRPr lang="en-US" dirty="0"/>
           </a:p>
@@ -5376,14 +5900,14 @@
           <a:bodyPr/>
           <a:lstStyle/>
           <a:p>
-            <a:endParaRPr lang="en-US"/>
+            <a:endParaRPr lang="en-US" dirty="0"/>
           </a:p>
         </p:txBody>
       </p:sp>
     </p:spTree>
     <p:extLst>
       <p:ext uri="{BB962C8B-B14F-4D97-AF65-F5344CB8AC3E}">
-        <p14:creationId xmlns:p14="http://schemas.microsoft.com/office/powerpoint/2010/main" val="3017978147"/>
+        <p14:creationId xmlns:p14="http://schemas.microsoft.com/office/powerpoint/2010/main" val="933988275"/>
       </p:ext>
     </p:extLst>
   </p:cSld>
@@ -5422,22 +5946,18 @@
         </p:nvSpPr>
         <p:spPr/>
         <p:txBody>
-          <a:bodyPr>
-            <a:normAutofit fontScale="90000"/>
-          </a:bodyPr>
-          <a:lstStyle/>
-          <a:p>
-            <a:pPr marL="0" indent="0">
-              <a:buNone/>
-            </a:pPr>
+          <a:bodyPr/>
+          <a:lstStyle/>
+          <a:p>
             <a:r>
               <a:rPr lang="en-US" dirty="0" smtClean="0"/>
-              <a:t>Example Application: Controlling Your </a:t>
-            </a:r>
-            <a:r>
-              <a:rPr lang="en-US" dirty="0" smtClean="0"/>
-              <a:t>Destiny</a:t>
-            </a:r>
+              <a:t>Pattern: "Provable"</a:t>
+            </a:r>
+            <a:r>
+              <a:rPr lang="en-US" baseline="0" dirty="0" smtClean="0"/>
+              <a:t> Security</a:t>
+            </a:r>
+            <a:endParaRPr lang="en-US" dirty="0"/>
           </a:p>
         </p:txBody>
       </p:sp>
@@ -5456,17 +5976,14 @@
           <a:bodyPr/>
           <a:lstStyle/>
           <a:p>
-            <a:pPr marL="0" indent="0">
-              <a:buNone/>
-            </a:pPr>
-            <a:endParaRPr lang="en-US" smtClean="0"/>
+            <a:endParaRPr lang="en-US"/>
           </a:p>
         </p:txBody>
       </p:sp>
     </p:spTree>
     <p:extLst>
       <p:ext uri="{BB962C8B-B14F-4D97-AF65-F5344CB8AC3E}">
-        <p14:creationId xmlns:p14="http://schemas.microsoft.com/office/powerpoint/2010/main" val="3520904702"/>
+        <p14:creationId xmlns:p14="http://schemas.microsoft.com/office/powerpoint/2010/main" val="3017978147"/>
       </p:ext>
     </p:extLst>
   </p:cSld>
@@ -5505,18 +6022,18 @@
         </p:nvSpPr>
         <p:spPr/>
         <p:txBody>
-          <a:bodyPr/>
-          <a:lstStyle/>
-          <a:p>
+          <a:bodyPr>
+            <a:normAutofit fontScale="90000"/>
+          </a:bodyPr>
+          <a:lstStyle/>
+          <a:p>
+            <a:pPr marL="0" indent="0">
+              <a:buNone/>
+            </a:pPr>
             <a:r>
               <a:rPr lang="en-US" dirty="0" smtClean="0"/>
-              <a:t>Anti-Pattern:</a:t>
-            </a:r>
-            <a:r>
-              <a:rPr lang="en-US" baseline="0" dirty="0" smtClean="0"/>
-              <a:t> Lock it Down</a:t>
-            </a:r>
-            <a:endParaRPr lang="en-US" dirty="0"/>
+              <a:t>Example Application: Controlling Your Destiny</a:t>
+            </a:r>
           </a:p>
         </p:txBody>
       </p:sp>
@@ -5535,14 +6052,17 @@
           <a:bodyPr/>
           <a:lstStyle/>
           <a:p>
-            <a:endParaRPr lang="en-US"/>
+            <a:pPr marL="0" indent="0">
+              <a:buNone/>
+            </a:pPr>
+            <a:endParaRPr lang="en-US" smtClean="0"/>
           </a:p>
         </p:txBody>
       </p:sp>
     </p:spTree>
     <p:extLst>
       <p:ext uri="{BB962C8B-B14F-4D97-AF65-F5344CB8AC3E}">
-        <p14:creationId xmlns:p14="http://schemas.microsoft.com/office/powerpoint/2010/main" val="1282280919"/>
+        <p14:creationId xmlns:p14="http://schemas.microsoft.com/office/powerpoint/2010/main" val="3520904702"/>
       </p:ext>
     </p:extLst>
   </p:cSld>
@@ -5586,11 +6106,11 @@
           <a:p>
             <a:r>
               <a:rPr lang="en-US" dirty="0" smtClean="0"/>
-              <a:t>Pattern:</a:t>
+              <a:t>Anti-Pattern:</a:t>
             </a:r>
             <a:r>
               <a:rPr lang="en-US" baseline="0" dirty="0" smtClean="0"/>
-              <a:t> Open it Up</a:t>
+              <a:t> Lock it Down</a:t>
             </a:r>
             <a:endParaRPr lang="en-US" dirty="0"/>
           </a:p>
@@ -5618,7 +6138,7 @@
     </p:spTree>
     <p:extLst>
       <p:ext uri="{BB962C8B-B14F-4D97-AF65-F5344CB8AC3E}">
-        <p14:creationId xmlns:p14="http://schemas.microsoft.com/office/powerpoint/2010/main" val="1690365460"/>
+        <p14:creationId xmlns:p14="http://schemas.microsoft.com/office/powerpoint/2010/main" val="1282280919"/>
       </p:ext>
     </p:extLst>
   </p:cSld>
@@ -5657,18 +6177,16 @@
         </p:nvSpPr>
         <p:spPr/>
         <p:txBody>
-          <a:bodyPr>
-            <a:normAutofit fontScale="90000"/>
-          </a:bodyPr>
+          <a:bodyPr/>
           <a:lstStyle/>
           <a:p>
             <a:r>
               <a:rPr lang="en-US" dirty="0" smtClean="0"/>
-              <a:t>--- Section 2: Organizational Patterns</a:t>
+              <a:t>Pattern:</a:t>
             </a:r>
             <a:r>
               <a:rPr lang="en-US" baseline="0" dirty="0" smtClean="0"/>
-              <a:t> ----</a:t>
+              <a:t> Open it Up</a:t>
             </a:r>
             <a:endParaRPr lang="en-US" dirty="0"/>
           </a:p>
@@ -5696,7 +6214,7 @@
     </p:spTree>
     <p:extLst>
       <p:ext uri="{BB962C8B-B14F-4D97-AF65-F5344CB8AC3E}">
-        <p14:creationId xmlns:p14="http://schemas.microsoft.com/office/powerpoint/2010/main" val="2406960158"/>
+        <p14:creationId xmlns:p14="http://schemas.microsoft.com/office/powerpoint/2010/main" val="1690365460"/>
       </p:ext>
     </p:extLst>
   </p:cSld>
@@ -5736,13 +6254,17 @@
         <p:spPr/>
         <p:txBody>
           <a:bodyPr>
-            <a:normAutofit/>
+            <a:normAutofit fontScale="90000"/>
           </a:bodyPr>
           <a:lstStyle/>
           <a:p>
             <a:r>
               <a:rPr lang="en-US" dirty="0" smtClean="0"/>
-              <a:t>Patterns in People (Organizational)</a:t>
+              <a:t>--- Section 2: Organizational Patterns</a:t>
+            </a:r>
+            <a:r>
+              <a:rPr lang="en-US" baseline="0" dirty="0" smtClean="0"/>
+              <a:t> ----</a:t>
             </a:r>
             <a:endParaRPr lang="en-US" dirty="0"/>
           </a:p>
@@ -5763,14 +6285,14 @@
           <a:bodyPr/>
           <a:lstStyle/>
           <a:p>
-            <a:endParaRPr lang="en-US" dirty="0"/>
+            <a:endParaRPr lang="en-US"/>
           </a:p>
         </p:txBody>
       </p:sp>
     </p:spTree>
     <p:extLst>
       <p:ext uri="{BB962C8B-B14F-4D97-AF65-F5344CB8AC3E}">
-        <p14:creationId xmlns:p14="http://schemas.microsoft.com/office/powerpoint/2010/main" val="81657338"/>
+        <p14:creationId xmlns:p14="http://schemas.microsoft.com/office/powerpoint/2010/main" val="2406960158"/>
       </p:ext>
     </p:extLst>
   </p:cSld>
@@ -5809,13 +6331,14 @@
         </p:nvSpPr>
         <p:spPr/>
         <p:txBody>
-          <a:bodyPr/>
-          <a:lstStyle/>
-          <a:p>
-            <a:pPr lvl="0"/>
-            <a:r>
-              <a:rPr lang="en-US" baseline="0" dirty="0" smtClean="0"/>
-              <a:t>Anti-pattern: Business Vacuum</a:t>
+          <a:bodyPr>
+            <a:normAutofit/>
+          </a:bodyPr>
+          <a:lstStyle/>
+          <a:p>
+            <a:r>
+              <a:rPr lang="en-US" dirty="0" smtClean="0"/>
+              <a:t>Patterns in People (Organizational)</a:t>
             </a:r>
             <a:endParaRPr lang="en-US" dirty="0"/>
           </a:p>
@@ -5836,14 +6359,14 @@
           <a:bodyPr/>
           <a:lstStyle/>
           <a:p>
-            <a:endParaRPr lang="en-US"/>
+            <a:endParaRPr lang="en-US" dirty="0"/>
           </a:p>
         </p:txBody>
       </p:sp>
     </p:spTree>
     <p:extLst>
       <p:ext uri="{BB962C8B-B14F-4D97-AF65-F5344CB8AC3E}">
-        <p14:creationId xmlns:p14="http://schemas.microsoft.com/office/powerpoint/2010/main" val="2946472026"/>
+        <p14:creationId xmlns:p14="http://schemas.microsoft.com/office/powerpoint/2010/main" val="81657338"/>
       </p:ext>
     </p:extLst>
   </p:cSld>
@@ -5882,22 +6405,13 @@
         </p:nvSpPr>
         <p:spPr/>
         <p:txBody>
-          <a:bodyPr>
-            <a:normAutofit/>
-          </a:bodyPr>
-          <a:lstStyle/>
-          <a:p>
-            <a:r>
-              <a:rPr lang="en-US" dirty="0" smtClean="0"/>
-              <a:t>Anti-pattern:</a:t>
-            </a:r>
+          <a:bodyPr/>
+          <a:lstStyle/>
+          <a:p>
+            <a:pPr lvl="0"/>
             <a:r>
               <a:rPr lang="en-US" baseline="0" dirty="0" smtClean="0"/>
-              <a:t> </a:t>
-            </a:r>
-            <a:r>
-              <a:rPr lang="en-US" dirty="0" smtClean="0"/>
-              <a:t>Security Sandwich</a:t>
+              <a:t>Anti-pattern: Business Vacuum</a:t>
             </a:r>
             <a:endParaRPr lang="en-US" dirty="0"/>
           </a:p>
@@ -5918,33 +6432,14 @@
           <a:bodyPr/>
           <a:lstStyle/>
           <a:p>
-            <a:r>
-              <a:rPr lang="en-US" dirty="0" smtClean="0"/>
-              <a:t>Security</a:t>
-            </a:r>
-            <a:r>
-              <a:rPr lang="en-US" baseline="0" dirty="0" smtClean="0"/>
-              <a:t> Sandwich</a:t>
-            </a:r>
-          </a:p>
-          <a:p>
-            <a:r>
-              <a:rPr lang="en-US" baseline="0" dirty="0" smtClean="0"/>
-              <a:t>Open-Faced Security Sandwich</a:t>
-            </a:r>
-          </a:p>
-          <a:p>
-            <a:r>
-              <a:rPr lang="en-US" baseline="0" dirty="0" smtClean="0"/>
-              <a:t>Security Sandwich, Low Carb Version</a:t>
-            </a:r>
+            <a:endParaRPr lang="en-US"/>
           </a:p>
         </p:txBody>
       </p:sp>
     </p:spTree>
     <p:extLst>
       <p:ext uri="{BB962C8B-B14F-4D97-AF65-F5344CB8AC3E}">
-        <p14:creationId xmlns:p14="http://schemas.microsoft.com/office/powerpoint/2010/main" val="1968783290"/>
+        <p14:creationId xmlns:p14="http://schemas.microsoft.com/office/powerpoint/2010/main" val="2946472026"/>
       </p:ext>
     </p:extLst>
   </p:cSld>
@@ -5983,16 +6478,22 @@
         </p:nvSpPr>
         <p:spPr/>
         <p:txBody>
-          <a:bodyPr/>
+          <a:bodyPr>
+            <a:normAutofit/>
+          </a:bodyPr>
           <a:lstStyle/>
           <a:p>
             <a:r>
               <a:rPr lang="en-US" dirty="0" smtClean="0"/>
-              <a:t>Pattern:</a:t>
+              <a:t>Anti-pattern:</a:t>
             </a:r>
             <a:r>
               <a:rPr lang="en-US" baseline="0" dirty="0" smtClean="0"/>
-              <a:t> SDLC Integration</a:t>
+              <a:t> </a:t>
+            </a:r>
+            <a:r>
+              <a:rPr lang="en-US" dirty="0" smtClean="0"/>
+              <a:t>Security Sandwich</a:t>
             </a:r>
             <a:endParaRPr lang="en-US" dirty="0"/>
           </a:p>
@@ -6013,14 +6514,33 @@
           <a:bodyPr/>
           <a:lstStyle/>
           <a:p>
-            <a:endParaRPr lang="en-US"/>
+            <a:r>
+              <a:rPr lang="en-US" dirty="0" smtClean="0"/>
+              <a:t>Security</a:t>
+            </a:r>
+            <a:r>
+              <a:rPr lang="en-US" baseline="0" dirty="0" smtClean="0"/>
+              <a:t> Sandwich</a:t>
+            </a:r>
+          </a:p>
+          <a:p>
+            <a:r>
+              <a:rPr lang="en-US" baseline="0" dirty="0" smtClean="0"/>
+              <a:t>Open-Faced Security Sandwich</a:t>
+            </a:r>
+          </a:p>
+          <a:p>
+            <a:r>
+              <a:rPr lang="en-US" baseline="0" dirty="0" smtClean="0"/>
+              <a:t>Security Sandwich, Low Carb Version</a:t>
+            </a:r>
           </a:p>
         </p:txBody>
       </p:sp>
     </p:spTree>
     <p:extLst>
       <p:ext uri="{BB962C8B-B14F-4D97-AF65-F5344CB8AC3E}">
-        <p14:creationId xmlns:p14="http://schemas.microsoft.com/office/powerpoint/2010/main" val="2646128052"/>
+        <p14:creationId xmlns:p14="http://schemas.microsoft.com/office/powerpoint/2010/main" val="1968783290"/>
       </p:ext>
     </p:extLst>
   </p:cSld>
@@ -6064,11 +6584,11 @@
           <a:p>
             <a:r>
               <a:rPr lang="en-US" dirty="0" smtClean="0"/>
-              <a:t>--- Section 3: Blue Sky</a:t>
+              <a:t>Pattern:</a:t>
             </a:r>
             <a:r>
               <a:rPr lang="en-US" baseline="0" dirty="0" smtClean="0"/>
-              <a:t> ---</a:t>
+              <a:t> SDLC Integration</a:t>
             </a:r>
             <a:endParaRPr lang="en-US" dirty="0"/>
           </a:p>
@@ -6096,7 +6616,7 @@
     </p:spTree>
     <p:extLst>
       <p:ext uri="{BB962C8B-B14F-4D97-AF65-F5344CB8AC3E}">
-        <p14:creationId xmlns:p14="http://schemas.microsoft.com/office/powerpoint/2010/main" val="2351261104"/>
+        <p14:creationId xmlns:p14="http://schemas.microsoft.com/office/powerpoint/2010/main" val="2646128052"/>
       </p:ext>
     </p:extLst>
   </p:cSld>
@@ -6212,11 +6732,11 @@
           <a:p>
             <a:r>
               <a:rPr lang="en-US" dirty="0" smtClean="0"/>
-              <a:t>Blue Sky</a:t>
+              <a:t>--- Section 3: Blue Sky</a:t>
             </a:r>
             <a:r>
               <a:rPr lang="en-US" baseline="0" dirty="0" smtClean="0"/>
-              <a:t> …</a:t>
+              <a:t> ---</a:t>
             </a:r>
             <a:endParaRPr lang="en-US" dirty="0"/>
           </a:p>
@@ -6244,7 +6764,7 @@
     </p:spTree>
     <p:extLst>
       <p:ext uri="{BB962C8B-B14F-4D97-AF65-F5344CB8AC3E}">
-        <p14:creationId xmlns:p14="http://schemas.microsoft.com/office/powerpoint/2010/main" val="780004726"/>
+        <p14:creationId xmlns:p14="http://schemas.microsoft.com/office/powerpoint/2010/main" val="2351261104"/>
       </p:ext>
     </p:extLst>
   </p:cSld>
@@ -6288,6 +6808,82 @@
           <a:p>
             <a:r>
               <a:rPr lang="en-US" dirty="0" smtClean="0"/>
+              <a:t>Blue Sky</a:t>
+            </a:r>
+            <a:r>
+              <a:rPr lang="en-US" baseline="0" dirty="0" smtClean="0"/>
+              <a:t> …</a:t>
+            </a:r>
+            <a:endParaRPr lang="en-US" dirty="0"/>
+          </a:p>
+        </p:txBody>
+      </p:sp>
+      <p:sp>
+        <p:nvSpPr>
+          <p:cNvPr id="3" name="Content Placeholder 2"/>
+          <p:cNvSpPr>
+            <a:spLocks noGrp="1"/>
+          </p:cNvSpPr>
+          <p:nvPr>
+            <p:ph idx="1"/>
+          </p:nvPr>
+        </p:nvSpPr>
+        <p:spPr/>
+        <p:txBody>
+          <a:bodyPr/>
+          <a:lstStyle/>
+          <a:p>
+            <a:endParaRPr lang="en-US"/>
+          </a:p>
+        </p:txBody>
+      </p:sp>
+    </p:spTree>
+    <p:extLst>
+      <p:ext uri="{BB962C8B-B14F-4D97-AF65-F5344CB8AC3E}">
+        <p14:creationId xmlns:p14="http://schemas.microsoft.com/office/powerpoint/2010/main" val="780004726"/>
+      </p:ext>
+    </p:extLst>
+  </p:cSld>
+  <p:clrMapOvr>
+    <a:masterClrMapping/>
+  </p:clrMapOvr>
+</p:sld>
+</file>
+
+<file path=ppt/slides/slide32.xml><?xml version="1.0" encoding="utf-8"?>
+<p:sld xmlns:a="http://schemas.openxmlformats.org/drawingml/2006/main" xmlns:r="http://schemas.openxmlformats.org/officeDocument/2006/relationships" xmlns:p="http://schemas.openxmlformats.org/presentationml/2006/main">
+  <p:cSld>
+    <p:spTree>
+      <p:nvGrpSpPr>
+        <p:cNvPr id="1" name=""/>
+        <p:cNvGrpSpPr/>
+        <p:nvPr/>
+      </p:nvGrpSpPr>
+      <p:grpSpPr>
+        <a:xfrm>
+          <a:off x="0" y="0"/>
+          <a:ext cx="0" cy="0"/>
+          <a:chOff x="0" y="0"/>
+          <a:chExt cx="0" cy="0"/>
+        </a:xfrm>
+      </p:grpSpPr>
+      <p:sp>
+        <p:nvSpPr>
+          <p:cNvPr id="2" name="Title 1"/>
+          <p:cNvSpPr>
+            <a:spLocks noGrp="1"/>
+          </p:cNvSpPr>
+          <p:nvPr>
+            <p:ph type="title"/>
+          </p:nvPr>
+        </p:nvSpPr>
+        <p:spPr/>
+        <p:txBody>
+          <a:bodyPr/>
+          <a:lstStyle/>
+          <a:p>
+            <a:r>
+              <a:rPr lang="en-US" dirty="0" smtClean="0"/>
               <a:t>HDD Security</a:t>
             </a:r>
             <a:endParaRPr lang="en-US" dirty="0"/>
@@ -6326,7 +6922,7 @@
 </p:sld>
 </file>
 
-<file path=ppt/slides/slide32.xml><?xml version="1.0" encoding="utf-8"?>
+<file path=ppt/slides/slide33.xml><?xml version="1.0" encoding="utf-8"?>
 <p:sld xmlns:a="http://schemas.openxmlformats.org/drawingml/2006/main" xmlns:r="http://schemas.openxmlformats.org/officeDocument/2006/relationships" xmlns:p="http://schemas.openxmlformats.org/presentationml/2006/main">
   <p:cSld>
     <p:spTree>
@@ -6681,7 +7277,14 @@
           <a:bodyPr/>
           <a:lstStyle/>
           <a:p>
-            <a:endParaRPr lang="en-US"/>
+            <a:pPr marL="0" indent="0">
+              <a:buNone/>
+            </a:pPr>
+            <a:r>
+              <a:rPr lang="en-US" dirty="0" smtClean="0"/>
+              <a:t>Code / Content / Style</a:t>
+            </a:r>
+            <a:endParaRPr lang="en-US" dirty="0"/>
           </a:p>
         </p:txBody>
       </p:sp>
@@ -6732,11 +7335,11 @@
           <a:p>
             <a:r>
               <a:rPr lang="en-US" dirty="0" smtClean="0"/>
-              <a:t>How</a:t>
+              <a:t>Everything Old</a:t>
             </a:r>
             <a:r>
               <a:rPr lang="en-US" baseline="0" dirty="0" smtClean="0"/>
-              <a:t> to Make it (a Little Bit) Easier</a:t>
+              <a:t> is New Again</a:t>
             </a:r>
             <a:endParaRPr lang="en-US" dirty="0"/>
           </a:p>
@@ -6754,17 +7357,251 @@
         </p:nvSpPr>
         <p:spPr/>
         <p:txBody>
-          <a:bodyPr/>
-          <a:lstStyle/>
-          <a:p>
-            <a:endParaRPr lang="en-US"/>
+          <a:bodyPr>
+            <a:normAutofit lnSpcReduction="10000"/>
+          </a:bodyPr>
+          <a:lstStyle/>
+          <a:p>
+            <a:pPr marL="0" indent="0">
+              <a:buNone/>
+            </a:pPr>
+            <a:r>
+              <a:rPr lang="en-US" sz="2400" dirty="0" smtClean="0">
+                <a:latin typeface="Consolas"/>
+                <a:cs typeface="Consolas"/>
+              </a:rPr>
+              <a:t>&lt;html&gt;</a:t>
+            </a:r>
+          </a:p>
+          <a:p>
+            <a:pPr marL="0" indent="0">
+              <a:buNone/>
+            </a:pPr>
+            <a:r>
+              <a:rPr lang="en-US" sz="2400" dirty="0" smtClean="0">
+                <a:latin typeface="Consolas"/>
+                <a:cs typeface="Consolas"/>
+              </a:rPr>
+              <a:t>…</a:t>
+            </a:r>
+          </a:p>
+          <a:p>
+            <a:pPr marL="0" indent="0">
+              <a:buNone/>
+            </a:pPr>
+            <a:r>
+              <a:rPr lang="en-US" sz="2400" dirty="0">
+                <a:solidFill>
+                  <a:srgbClr val="008000"/>
+                </a:solidFill>
+                <a:latin typeface="Consolas"/>
+                <a:cs typeface="Consolas"/>
+              </a:rPr>
+              <a:t>	</a:t>
+            </a:r>
+            <a:r>
+              <a:rPr lang="en-US" sz="2400" dirty="0" smtClean="0">
+                <a:solidFill>
+                  <a:srgbClr val="008000"/>
+                </a:solidFill>
+                <a:latin typeface="Consolas"/>
+                <a:cs typeface="Consolas"/>
+              </a:rPr>
+              <a:t>&lt;style&gt;</a:t>
+            </a:r>
+          </a:p>
+          <a:p>
+            <a:pPr marL="0" indent="0">
+              <a:buNone/>
+            </a:pPr>
+            <a:r>
+              <a:rPr lang="en-US" sz="2400" dirty="0" smtClean="0">
+                <a:solidFill>
+                  <a:srgbClr val="008000"/>
+                </a:solidFill>
+                <a:latin typeface="Consolas"/>
+                <a:cs typeface="Consolas"/>
+              </a:rPr>
+              <a:t>		div { font-weight: bold; }</a:t>
+            </a:r>
+            <a:endParaRPr lang="en-US" sz="2400" dirty="0">
+              <a:solidFill>
+                <a:srgbClr val="008000"/>
+              </a:solidFill>
+              <a:latin typeface="Consolas"/>
+              <a:cs typeface="Consolas"/>
+            </a:endParaRPr>
+          </a:p>
+          <a:p>
+            <a:pPr marL="0" indent="0">
+              <a:buNone/>
+            </a:pPr>
+            <a:r>
+              <a:rPr lang="en-US" sz="2400" dirty="0" smtClean="0">
+                <a:solidFill>
+                  <a:srgbClr val="008000"/>
+                </a:solidFill>
+                <a:latin typeface="Consolas"/>
+                <a:cs typeface="Consolas"/>
+              </a:rPr>
+              <a:t>	&lt;/style&gt;</a:t>
+            </a:r>
+          </a:p>
+          <a:p>
+            <a:pPr marL="0" indent="0">
+              <a:buNone/>
+            </a:pPr>
+            <a:r>
+              <a:rPr lang="en-US" sz="2400" dirty="0" smtClean="0">
+                <a:solidFill>
+                  <a:srgbClr val="FF0000"/>
+                </a:solidFill>
+                <a:latin typeface="Consolas"/>
+                <a:cs typeface="Consolas"/>
+              </a:rPr>
+              <a:t>	&lt;script&gt;</a:t>
+            </a:r>
+          </a:p>
+          <a:p>
+            <a:pPr marL="0" indent="0">
+              <a:buNone/>
+            </a:pPr>
+            <a:r>
+              <a:rPr lang="en-US" sz="2400" dirty="0" smtClean="0">
+                <a:solidFill>
+                  <a:srgbClr val="FF0000"/>
+                </a:solidFill>
+                <a:latin typeface="Consolas"/>
+                <a:cs typeface="Consolas"/>
+              </a:rPr>
+              <a:t>		</a:t>
+            </a:r>
+            <a:r>
+              <a:rPr lang="en-US" sz="2400" dirty="0" err="1" smtClean="0">
+                <a:solidFill>
+                  <a:srgbClr val="FF0000"/>
+                </a:solidFill>
+                <a:latin typeface="Consolas"/>
+                <a:cs typeface="Consolas"/>
+              </a:rPr>
+              <a:t>doSomethingDangrousWith</a:t>
+            </a:r>
+            <a:r>
+              <a:rPr lang="en-US" sz="2400" dirty="0" smtClean="0">
+                <a:solidFill>
+                  <a:srgbClr val="FF0000"/>
+                </a:solidFill>
+                <a:latin typeface="Consolas"/>
+                <a:cs typeface="Consolas"/>
+              </a:rPr>
+              <a:t>(</a:t>
+            </a:r>
+            <a:r>
+              <a:rPr lang="en-US" sz="2400" dirty="0" err="1" smtClean="0">
+                <a:solidFill>
+                  <a:srgbClr val="FF0000"/>
+                </a:solidFill>
+                <a:latin typeface="Consolas"/>
+                <a:cs typeface="Consolas"/>
+              </a:rPr>
+              <a:t>untrustedContent</a:t>
+            </a:r>
+            <a:r>
+              <a:rPr lang="en-US" sz="2400" dirty="0" smtClean="0">
+                <a:solidFill>
+                  <a:srgbClr val="FF0000"/>
+                </a:solidFill>
+                <a:latin typeface="Consolas"/>
+                <a:cs typeface="Consolas"/>
+              </a:rPr>
+              <a:t>);</a:t>
+            </a:r>
+            <a:endParaRPr lang="en-US" sz="2400" dirty="0">
+              <a:solidFill>
+                <a:srgbClr val="FF0000"/>
+              </a:solidFill>
+              <a:latin typeface="Consolas"/>
+              <a:cs typeface="Consolas"/>
+            </a:endParaRPr>
+          </a:p>
+          <a:p>
+            <a:pPr marL="0" indent="0">
+              <a:buNone/>
+            </a:pPr>
+            <a:r>
+              <a:rPr lang="en-US" sz="2400" dirty="0" smtClean="0">
+                <a:solidFill>
+                  <a:srgbClr val="FF0000"/>
+                </a:solidFill>
+                <a:latin typeface="Consolas"/>
+                <a:cs typeface="Consolas"/>
+              </a:rPr>
+              <a:t>	&lt;/script&gt;</a:t>
+            </a:r>
+          </a:p>
+          <a:p>
+            <a:pPr marL="0" indent="0">
+              <a:buNone/>
+            </a:pPr>
+            <a:r>
+              <a:rPr lang="en-US" sz="2400" dirty="0">
+                <a:latin typeface="Consolas"/>
+                <a:cs typeface="Consolas"/>
+              </a:rPr>
+              <a:t>	</a:t>
+            </a:r>
+            <a:r>
+              <a:rPr lang="en-US" sz="2400" dirty="0" smtClean="0">
+                <a:solidFill>
+                  <a:schemeClr val="tx2">
+                    <a:lumMod val="60000"/>
+                    <a:lumOff val="40000"/>
+                  </a:schemeClr>
+                </a:solidFill>
+                <a:latin typeface="Consolas"/>
+                <a:cs typeface="Consolas"/>
+              </a:rPr>
+              <a:t>&lt;div&gt;Hello Dangerous Internet World&lt;/div&gt;</a:t>
+            </a:r>
+          </a:p>
+          <a:p>
+            <a:pPr marL="0" indent="0">
+              <a:buNone/>
+            </a:pPr>
+            <a:r>
+              <a:rPr lang="en-US" sz="2400" dirty="0" smtClean="0">
+                <a:latin typeface="Consolas"/>
+                <a:cs typeface="Consolas"/>
+              </a:rPr>
+              <a:t>…</a:t>
+            </a:r>
+            <a:endParaRPr lang="en-US" sz="2400" dirty="0">
+              <a:latin typeface="Consolas"/>
+              <a:cs typeface="Consolas"/>
+            </a:endParaRPr>
+          </a:p>
+          <a:p>
+            <a:pPr marL="0" indent="0">
+              <a:buNone/>
+            </a:pPr>
+            <a:r>
+              <a:rPr lang="en-US" sz="2400" dirty="0" smtClean="0">
+                <a:latin typeface="Consolas"/>
+                <a:cs typeface="Consolas"/>
+              </a:rPr>
+              <a:t>&lt;/html&gt;</a:t>
+            </a:r>
+            <a:endParaRPr lang="en-US" sz="2400" dirty="0">
+              <a:latin typeface="Consolas"/>
+              <a:cs typeface="Consolas"/>
+            </a:endParaRPr>
           </a:p>
         </p:txBody>
       </p:sp>
     </p:spTree>
     <p:extLst>
       <p:ext uri="{BB962C8B-B14F-4D97-AF65-F5344CB8AC3E}">
-        <p14:creationId xmlns:p14="http://schemas.microsoft.com/office/powerpoint/2010/main" val="1775736731"/>
+        <p14:creationId xmlns:p14="http://schemas.microsoft.com/office/powerpoint/2010/main" val="2324438303"/>
       </p:ext>
     </p:extLst>
   </p:cSld>
@@ -6803,18 +7640,16 @@
         </p:nvSpPr>
         <p:spPr/>
         <p:txBody>
-          <a:bodyPr>
-            <a:normAutofit fontScale="90000"/>
-          </a:bodyPr>
+          <a:bodyPr/>
           <a:lstStyle/>
           <a:p>
             <a:r>
               <a:rPr lang="en-US" dirty="0" smtClean="0"/>
-              <a:t>--- Section 1:</a:t>
+              <a:t>How</a:t>
             </a:r>
             <a:r>
               <a:rPr lang="en-US" baseline="0" dirty="0" smtClean="0"/>
-              <a:t> Development Patterns ---</a:t>
+              <a:t> to Make it (a Little Bit) Easier</a:t>
             </a:r>
             <a:endParaRPr lang="en-US" dirty="0"/>
           </a:p>
@@ -6842,7 +7677,7 @@
     </p:spTree>
     <p:extLst>
       <p:ext uri="{BB962C8B-B14F-4D97-AF65-F5344CB8AC3E}">
-        <p14:creationId xmlns:p14="http://schemas.microsoft.com/office/powerpoint/2010/main" val="1570912143"/>
+        <p14:creationId xmlns:p14="http://schemas.microsoft.com/office/powerpoint/2010/main" val="1775736731"/>
       </p:ext>
     </p:extLst>
   </p:cSld>

</xml_diff>